<commit_message>
Periodic Post Trip commit
Post trip prior to 18Month submission
</commit_message>
<xml_diff>
--- a/MOL_PDE/3. Documentation/Explanation of Diffusion Waves Cont.pptx
+++ b/MOL_PDE/3. Documentation/Explanation of Diffusion Waves Cont.pptx
@@ -11,11 +11,9 @@
     <p:sldId id="273" r:id="rId5"/>
     <p:sldId id="276" r:id="rId6"/>
     <p:sldId id="277" r:id="rId7"/>
-    <p:sldId id="278" r:id="rId8"/>
-    <p:sldId id="279" r:id="rId9"/>
-    <p:sldId id="270" r:id="rId10"/>
-    <p:sldId id="271" r:id="rId11"/>
-    <p:sldId id="274" r:id="rId12"/>
+    <p:sldId id="280" r:id="rId8"/>
+    <p:sldId id="278" r:id="rId9"/>
+    <p:sldId id="279" r:id="rId10"/>
   </p:sldIdLst>
   <p:sldSz cx="9144000" cy="6858000" type="screen4x3"/>
   <p:notesSz cx="6858000" cy="9144000"/>
@@ -347,7 +345,7 @@
           <a:p>
             <a:fld id="{3C2ED145-7620-41E4-9C5F-C72587FA36F6}" type="datetimeFigureOut">
               <a:rPr lang="en-NZ" smtClean="0"/>
-              <a:t>24/04/2016</a:t>
+              <a:t>1/05/2016</a:t>
             </a:fld>
             <a:endParaRPr lang="en-NZ"/>
           </a:p>
@@ -560,7 +558,7 @@
           <a:p>
             <a:fld id="{3C2ED145-7620-41E4-9C5F-C72587FA36F6}" type="datetimeFigureOut">
               <a:rPr lang="en-NZ" smtClean="0"/>
-              <a:t>24/04/2016</a:t>
+              <a:t>1/05/2016</a:t>
             </a:fld>
             <a:endParaRPr lang="en-NZ"/>
           </a:p>
@@ -735,7 +733,7 @@
           <a:p>
             <a:fld id="{3C2ED145-7620-41E4-9C5F-C72587FA36F6}" type="datetimeFigureOut">
               <a:rPr lang="en-NZ" smtClean="0"/>
-              <a:t>24/04/2016</a:t>
+              <a:t>1/05/2016</a:t>
             </a:fld>
             <a:endParaRPr lang="en-NZ"/>
           </a:p>
@@ -900,7 +898,7 @@
           <a:p>
             <a:fld id="{3C2ED145-7620-41E4-9C5F-C72587FA36F6}" type="datetimeFigureOut">
               <a:rPr lang="en-NZ" smtClean="0"/>
-              <a:t>24/04/2016</a:t>
+              <a:t>1/05/2016</a:t>
             </a:fld>
             <a:endParaRPr lang="en-NZ"/>
           </a:p>
@@ -1184,7 +1182,7 @@
           <a:p>
             <a:fld id="{3C2ED145-7620-41E4-9C5F-C72587FA36F6}" type="datetimeFigureOut">
               <a:rPr lang="en-NZ" smtClean="0"/>
-              <a:t>24/04/2016</a:t>
+              <a:t>1/05/2016</a:t>
             </a:fld>
             <a:endParaRPr lang="en-NZ"/>
           </a:p>
@@ -1510,7 +1508,7 @@
           <a:p>
             <a:fld id="{3C2ED145-7620-41E4-9C5F-C72587FA36F6}" type="datetimeFigureOut">
               <a:rPr lang="en-NZ" smtClean="0"/>
-              <a:t>24/04/2016</a:t>
+              <a:t>1/05/2016</a:t>
             </a:fld>
             <a:endParaRPr lang="en-NZ"/>
           </a:p>
@@ -1935,7 +1933,7 @@
           <a:p>
             <a:fld id="{3C2ED145-7620-41E4-9C5F-C72587FA36F6}" type="datetimeFigureOut">
               <a:rPr lang="en-NZ" smtClean="0"/>
-              <a:t>24/04/2016</a:t>
+              <a:t>1/05/2016</a:t>
             </a:fld>
             <a:endParaRPr lang="en-NZ"/>
           </a:p>
@@ -2108,7 +2106,7 @@
           <a:p>
             <a:fld id="{3C2ED145-7620-41E4-9C5F-C72587FA36F6}" type="datetimeFigureOut">
               <a:rPr lang="en-NZ" smtClean="0"/>
-              <a:t>24/04/2016</a:t>
+              <a:t>1/05/2016</a:t>
             </a:fld>
             <a:endParaRPr lang="en-NZ"/>
           </a:p>
@@ -2198,7 +2196,7 @@
           <a:p>
             <a:fld id="{3C2ED145-7620-41E4-9C5F-C72587FA36F6}" type="datetimeFigureOut">
               <a:rPr lang="en-NZ" smtClean="0"/>
-              <a:t>24/04/2016</a:t>
+              <a:t>1/05/2016</a:t>
             </a:fld>
             <a:endParaRPr lang="en-NZ"/>
           </a:p>
@@ -2478,7 +2476,7 @@
           <a:p>
             <a:fld id="{3C2ED145-7620-41E4-9C5F-C72587FA36F6}" type="datetimeFigureOut">
               <a:rPr lang="en-NZ" smtClean="0"/>
-              <a:t>24/04/2016</a:t>
+              <a:t>1/05/2016</a:t>
             </a:fld>
             <a:endParaRPr lang="en-NZ"/>
           </a:p>
@@ -2777,7 +2775,7 @@
           <a:p>
             <a:fld id="{3C2ED145-7620-41E4-9C5F-C72587FA36F6}" type="datetimeFigureOut">
               <a:rPr lang="en-NZ" smtClean="0"/>
-              <a:t>24/04/2016</a:t>
+              <a:t>1/05/2016</a:t>
             </a:fld>
             <a:endParaRPr lang="en-NZ"/>
           </a:p>
@@ -2987,7 +2985,7 @@
           <a:p>
             <a:fld id="{3C2ED145-7620-41E4-9C5F-C72587FA36F6}" type="datetimeFigureOut">
               <a:rPr lang="en-NZ" smtClean="0"/>
-              <a:t>24/04/2016</a:t>
+              <a:t>1/05/2016</a:t>
             </a:fld>
             <a:endParaRPr lang="en-NZ"/>
           </a:p>
@@ -3555,11 +3553,7 @@
             <a:pPr algn="ctr"/>
             <a:r>
               <a:rPr lang="en-NZ" sz="6600" dirty="0" smtClean="0"/>
-              <a:t>Explanation of </a:t>
-            </a:r>
-            <a:r>
-              <a:rPr lang="en-NZ" sz="6600" dirty="0" smtClean="0"/>
-              <a:t>Diffusion Waves</a:t>
+              <a:t>Explanation of Diffusion Waves</a:t>
             </a:r>
             <a:endParaRPr lang="en-NZ" sz="6600" dirty="0"/>
           </a:p>
@@ -3628,903 +3622,6 @@
   <p:clrMapOvr>
     <a:masterClrMapping/>
   </p:clrMapOvr>
-  <p:timing>
-    <p:tnLst>
-      <p:par>
-        <p:cTn id="1" dur="indefinite" restart="never" nodeType="tmRoot"/>
-      </p:par>
-    </p:tnLst>
-  </p:timing>
-</p:sld>
-</file>
-
-<file path=ppt/slides/slide10.xml><?xml version="1.0" encoding="utf-8"?>
-<p:sld xmlns:a="http://schemas.openxmlformats.org/drawingml/2006/main" xmlns:r="http://schemas.openxmlformats.org/officeDocument/2006/relationships" xmlns:p="http://schemas.openxmlformats.org/presentationml/2006/main">
-  <p:cSld>
-    <p:spTree>
-      <p:nvGrpSpPr>
-        <p:cNvPr id="1" name=""/>
-        <p:cNvGrpSpPr/>
-        <p:nvPr/>
-      </p:nvGrpSpPr>
-      <p:grpSpPr>
-        <a:xfrm>
-          <a:off x="0" y="0"/>
-          <a:ext cx="0" cy="0"/>
-          <a:chOff x="0" y="0"/>
-          <a:chExt cx="0" cy="0"/>
-        </a:xfrm>
-      </p:grpSpPr>
-      <p:sp>
-        <p:nvSpPr>
-          <p:cNvPr id="27" name="Rectangle 26"/>
-          <p:cNvSpPr/>
-          <p:nvPr/>
-        </p:nvSpPr>
-        <p:spPr>
-          <a:xfrm>
-            <a:off x="5868144" y="1700808"/>
-            <a:ext cx="1557573" cy="4392488"/>
-          </a:xfrm>
-          <a:prstGeom prst="rect">
-            <a:avLst/>
-          </a:prstGeom>
-          <a:noFill/>
-          <a:ln>
-            <a:solidFill>
-              <a:srgbClr val="FB05DE"/>
-            </a:solidFill>
-          </a:ln>
-        </p:spPr>
-        <p:style>
-          <a:lnRef idx="2">
-            <a:schemeClr val="accent1">
-              <a:shade val="50000"/>
-            </a:schemeClr>
-          </a:lnRef>
-          <a:fillRef idx="1">
-            <a:schemeClr val="accent1"/>
-          </a:fillRef>
-          <a:effectRef idx="0">
-            <a:schemeClr val="accent1"/>
-          </a:effectRef>
-          <a:fontRef idx="minor">
-            <a:schemeClr val="lt1"/>
-          </a:fontRef>
-        </p:style>
-        <p:txBody>
-          <a:bodyPr rtlCol="0" anchor="ctr"/>
-          <a:lstStyle/>
-          <a:p>
-            <a:pPr algn="ctr"/>
-            <a:endParaRPr lang="en-NZ"/>
-          </a:p>
-        </p:txBody>
-      </p:sp>
-      <p:sp>
-        <p:nvSpPr>
-          <p:cNvPr id="34" name="Rectangle 33"/>
-          <p:cNvSpPr/>
-          <p:nvPr/>
-        </p:nvSpPr>
-        <p:spPr>
-          <a:xfrm>
-            <a:off x="4427985" y="1700808"/>
-            <a:ext cx="1440159" cy="4392488"/>
-          </a:xfrm>
-          <a:prstGeom prst="rect">
-            <a:avLst/>
-          </a:prstGeom>
-          <a:noFill/>
-          <a:ln>
-            <a:solidFill>
-              <a:srgbClr val="FF0000"/>
-            </a:solidFill>
-          </a:ln>
-        </p:spPr>
-        <p:style>
-          <a:lnRef idx="2">
-            <a:schemeClr val="accent1">
-              <a:shade val="50000"/>
-            </a:schemeClr>
-          </a:lnRef>
-          <a:fillRef idx="1">
-            <a:schemeClr val="accent1"/>
-          </a:fillRef>
-          <a:effectRef idx="0">
-            <a:schemeClr val="accent1"/>
-          </a:effectRef>
-          <a:fontRef idx="minor">
-            <a:schemeClr val="lt1"/>
-          </a:fontRef>
-        </p:style>
-        <p:txBody>
-          <a:bodyPr rtlCol="0" anchor="ctr"/>
-          <a:lstStyle/>
-          <a:p>
-            <a:pPr algn="ctr"/>
-            <a:endParaRPr lang="en-NZ"/>
-          </a:p>
-        </p:txBody>
-      </p:sp>
-      <p:pic>
-        <p:nvPicPr>
-          <p:cNvPr id="2051" name="Picture 3"/>
-          <p:cNvPicPr>
-            <a:picLocks noChangeAspect="1" noChangeArrowheads="1"/>
-          </p:cNvPicPr>
-          <p:nvPr/>
-        </p:nvPicPr>
-        <p:blipFill>
-          <a:blip r:embed="rId2">
-            <a:clrChange>
-              <a:clrFrom>
-                <a:srgbClr val="FFFFFF"/>
-              </a:clrFrom>
-              <a:clrTo>
-                <a:srgbClr val="FFFFFF">
-                  <a:alpha val="0"/>
-                </a:srgbClr>
-              </a:clrTo>
-            </a:clrChange>
-            <a:extLst>
-              <a:ext uri="{28A0092B-C50C-407E-A947-70E740481C1C}">
-                <a14:useLocalDpi xmlns:a14="http://schemas.microsoft.com/office/drawing/2010/main" val="0"/>
-              </a:ext>
-            </a:extLst>
-          </a:blip>
-          <a:srcRect/>
-          <a:stretch>
-            <a:fillRect/>
-          </a:stretch>
-        </p:blipFill>
-        <p:spPr bwMode="auto">
-          <a:xfrm>
-            <a:off x="827584" y="1556792"/>
-            <a:ext cx="7152680" cy="4333054"/>
-          </a:xfrm>
-          <a:prstGeom prst="rect">
-            <a:avLst/>
-          </a:prstGeom>
-          <a:noFill/>
-          <a:ln>
-            <a:noFill/>
-          </a:ln>
-          <a:effectLst/>
-          <a:extLst>
-            <a:ext uri="{909E8E84-426E-40DD-AFC4-6F175D3DCCD1}">
-              <a14:hiddenFill xmlns:a14="http://schemas.microsoft.com/office/drawing/2010/main">
-                <a:solidFill>
-                  <a:schemeClr val="accent1"/>
-                </a:solidFill>
-              </a14:hiddenFill>
-            </a:ext>
-            <a:ext uri="{91240B29-F687-4F45-9708-019B960494DF}">
-              <a14:hiddenLine xmlns:a14="http://schemas.microsoft.com/office/drawing/2010/main" w="9525">
-                <a:solidFill>
-                  <a:schemeClr val="tx1"/>
-                </a:solidFill>
-                <a:miter lim="800000"/>
-                <a:headEnd/>
-                <a:tailEnd/>
-              </a14:hiddenLine>
-            </a:ext>
-            <a:ext uri="{AF507438-7753-43E0-B8FC-AC1667EBCBE1}">
-              <a14:hiddenEffects xmlns:a14="http://schemas.microsoft.com/office/drawing/2010/main">
-                <a:effectLst>
-                  <a:outerShdw dist="35921" dir="2700000" algn="ctr" rotWithShape="0">
-                    <a:schemeClr val="bg2"/>
-                  </a:outerShdw>
-                </a:effectLst>
-              </a14:hiddenEffects>
-            </a:ext>
-          </a:extLst>
-        </p:spPr>
-      </p:pic>
-      <p:sp>
-        <p:nvSpPr>
-          <p:cNvPr id="10" name="TextBox 9"/>
-          <p:cNvSpPr txBox="1"/>
-          <p:nvPr/>
-        </p:nvSpPr>
-        <p:spPr>
-          <a:xfrm>
-            <a:off x="1259632" y="332656"/>
-            <a:ext cx="6624736" cy="646331"/>
-          </a:xfrm>
-          <a:prstGeom prst="rect">
-            <a:avLst/>
-          </a:prstGeom>
-          <a:noFill/>
-        </p:spPr>
-        <p:txBody>
-          <a:bodyPr wrap="square" rtlCol="0">
-            <a:spAutoFit/>
-          </a:bodyPr>
-          <a:lstStyle/>
-          <a:p>
-            <a:r>
-              <a:rPr lang="en-NZ" dirty="0" smtClean="0"/>
-              <a:t>What is the relationship between beta, the single wave profile and </a:t>
-            </a:r>
-            <a:r>
-              <a:rPr lang="en-NZ" dirty="0" err="1" smtClean="0"/>
-              <a:t>t</a:t>
-            </a:r>
-            <a:r>
-              <a:rPr lang="en-NZ" baseline="-25000" dirty="0" err="1" smtClean="0"/>
-              <a:t>lag</a:t>
-            </a:r>
-            <a:r>
-              <a:rPr lang="en-NZ" baseline="-25000" dirty="0" smtClean="0"/>
-              <a:t> </a:t>
-            </a:r>
-            <a:r>
-              <a:rPr lang="en-NZ" dirty="0" smtClean="0"/>
-              <a:t>for zero diffusion?</a:t>
-            </a:r>
-            <a:endParaRPr lang="en-NZ" dirty="0"/>
-          </a:p>
-        </p:txBody>
-      </p:sp>
-      <p:sp>
-        <p:nvSpPr>
-          <p:cNvPr id="2" name="Rectangle 1"/>
-          <p:cNvSpPr/>
-          <p:nvPr/>
-        </p:nvSpPr>
-        <p:spPr>
-          <a:xfrm>
-            <a:off x="2987825" y="1700808"/>
-            <a:ext cx="1440160" cy="4392488"/>
-          </a:xfrm>
-          <a:prstGeom prst="rect">
-            <a:avLst/>
-          </a:prstGeom>
-          <a:noFill/>
-          <a:ln>
-            <a:solidFill>
-              <a:srgbClr val="00B050"/>
-            </a:solidFill>
-          </a:ln>
-        </p:spPr>
-        <p:style>
-          <a:lnRef idx="2">
-            <a:schemeClr val="accent1">
-              <a:shade val="50000"/>
-            </a:schemeClr>
-          </a:lnRef>
-          <a:fillRef idx="1">
-            <a:schemeClr val="accent1"/>
-          </a:fillRef>
-          <a:effectRef idx="0">
-            <a:schemeClr val="accent1"/>
-          </a:effectRef>
-          <a:fontRef idx="minor">
-            <a:schemeClr val="lt1"/>
-          </a:fontRef>
-        </p:style>
-        <p:txBody>
-          <a:bodyPr rtlCol="0" anchor="ctr"/>
-          <a:lstStyle/>
-          <a:p>
-            <a:pPr algn="ctr"/>
-            <a:endParaRPr lang="en-NZ"/>
-          </a:p>
-        </p:txBody>
-      </p:sp>
-      <p:sp>
-        <p:nvSpPr>
-          <p:cNvPr id="12" name="Title 1"/>
-          <p:cNvSpPr>
-            <a:spLocks noGrp="1"/>
-          </p:cNvSpPr>
-          <p:nvPr>
-            <p:ph type="title"/>
-          </p:nvPr>
-        </p:nvSpPr>
-        <p:spPr>
-          <a:xfrm>
-            <a:off x="467544" y="764704"/>
-            <a:ext cx="8424936" cy="864096"/>
-          </a:xfrm>
-        </p:spPr>
-        <p:txBody>
-          <a:bodyPr>
-            <a:noAutofit/>
-          </a:bodyPr>
-          <a:lstStyle/>
-          <a:p>
-            <a:pPr algn="ctr"/>
-            <a:r>
-              <a:rPr lang="en-NZ" sz="4400" dirty="0" smtClean="0">
-                <a:solidFill>
-                  <a:schemeClr val="tx1"/>
-                </a:solidFill>
-              </a:rPr>
-              <a:t>Beta vs Single Wave Profile</a:t>
-            </a:r>
-            <a:endParaRPr lang="en-NZ" dirty="0">
-              <a:solidFill>
-                <a:schemeClr val="tx1"/>
-              </a:solidFill>
-            </a:endParaRPr>
-          </a:p>
-        </p:txBody>
-      </p:sp>
-      <p:sp>
-        <p:nvSpPr>
-          <p:cNvPr id="26" name="Rectangle 25"/>
-          <p:cNvSpPr/>
-          <p:nvPr/>
-        </p:nvSpPr>
-        <p:spPr>
-          <a:xfrm>
-            <a:off x="1475657" y="1694736"/>
-            <a:ext cx="1512167" cy="2202316"/>
-          </a:xfrm>
-          <a:prstGeom prst="rect">
-            <a:avLst/>
-          </a:prstGeom>
-          <a:noFill/>
-          <a:ln>
-            <a:solidFill>
-              <a:srgbClr val="7030A0"/>
-            </a:solidFill>
-          </a:ln>
-        </p:spPr>
-        <p:style>
-          <a:lnRef idx="2">
-            <a:schemeClr val="accent1">
-              <a:shade val="50000"/>
-            </a:schemeClr>
-          </a:lnRef>
-          <a:fillRef idx="1">
-            <a:schemeClr val="accent1"/>
-          </a:fillRef>
-          <a:effectRef idx="0">
-            <a:schemeClr val="accent1"/>
-          </a:effectRef>
-          <a:fontRef idx="minor">
-            <a:schemeClr val="lt1"/>
-          </a:fontRef>
-        </p:style>
-        <p:txBody>
-          <a:bodyPr rtlCol="0" anchor="ctr"/>
-          <a:lstStyle/>
-          <a:p>
-            <a:pPr algn="ctr"/>
-            <a:endParaRPr lang="en-NZ"/>
-          </a:p>
-        </p:txBody>
-      </p:sp>
-    </p:spTree>
-    <p:extLst>
-      <p:ext uri="{BB962C8B-B14F-4D97-AF65-F5344CB8AC3E}">
-        <p14:creationId xmlns:p14="http://schemas.microsoft.com/office/powerpoint/2010/main" val="1646118702"/>
-      </p:ext>
-    </p:extLst>
-  </p:cSld>
-  <p:clrMapOvr>
-    <a:masterClrMapping/>
-  </p:clrMapOvr>
-  <mc:AlternateContent xmlns:mc="http://schemas.openxmlformats.org/markup-compatibility/2006">
-    <mc:Choice xmlns:p14="http://schemas.microsoft.com/office/powerpoint/2010/main" Requires="p14">
-      <p:transition p14:dur="0"/>
-    </mc:Choice>
-    <mc:Fallback>
-      <p:transition/>
-    </mc:Fallback>
-  </mc:AlternateContent>
-  <p:timing>
-    <p:tnLst>
-      <p:par>
-        <p:cTn id="1" dur="indefinite" restart="never" nodeType="tmRoot"/>
-      </p:par>
-    </p:tnLst>
-  </p:timing>
-</p:sld>
-</file>
-
-<file path=ppt/slides/slide11.xml><?xml version="1.0" encoding="utf-8"?>
-<p:sld xmlns:a="http://schemas.openxmlformats.org/drawingml/2006/main" xmlns:r="http://schemas.openxmlformats.org/officeDocument/2006/relationships" xmlns:p="http://schemas.openxmlformats.org/presentationml/2006/main">
-  <p:cSld>
-    <p:spTree>
-      <p:nvGrpSpPr>
-        <p:cNvPr id="1" name=""/>
-        <p:cNvGrpSpPr/>
-        <p:nvPr/>
-      </p:nvGrpSpPr>
-      <p:grpSpPr>
-        <a:xfrm>
-          <a:off x="0" y="0"/>
-          <a:ext cx="0" cy="0"/>
-          <a:chOff x="0" y="0"/>
-          <a:chExt cx="0" cy="0"/>
-        </a:xfrm>
-      </p:grpSpPr>
-      <p:sp>
-        <p:nvSpPr>
-          <p:cNvPr id="10" name="TextBox 9"/>
-          <p:cNvSpPr txBox="1"/>
-          <p:nvPr/>
-        </p:nvSpPr>
-        <p:spPr>
-          <a:xfrm>
-            <a:off x="1259632" y="332656"/>
-            <a:ext cx="6624736" cy="646331"/>
-          </a:xfrm>
-          <a:prstGeom prst="rect">
-            <a:avLst/>
-          </a:prstGeom>
-          <a:noFill/>
-        </p:spPr>
-        <p:txBody>
-          <a:bodyPr wrap="square" rtlCol="0">
-            <a:spAutoFit/>
-          </a:bodyPr>
-          <a:lstStyle/>
-          <a:p>
-            <a:r>
-              <a:rPr lang="en-NZ" dirty="0" smtClean="0"/>
-              <a:t>What is the relationship between beta, the single wave profile and </a:t>
-            </a:r>
-            <a:r>
-              <a:rPr lang="en-NZ" dirty="0" err="1" smtClean="0"/>
-              <a:t>t</a:t>
-            </a:r>
-            <a:r>
-              <a:rPr lang="en-NZ" baseline="-25000" dirty="0" err="1" smtClean="0"/>
-              <a:t>lag</a:t>
-            </a:r>
-            <a:r>
-              <a:rPr lang="en-NZ" baseline="-25000" dirty="0" smtClean="0"/>
-              <a:t> </a:t>
-            </a:r>
-            <a:r>
-              <a:rPr lang="en-NZ" dirty="0" smtClean="0"/>
-              <a:t>for zero diffusion?</a:t>
-            </a:r>
-            <a:endParaRPr lang="en-NZ" dirty="0"/>
-          </a:p>
-        </p:txBody>
-      </p:sp>
-      <p:sp>
-        <p:nvSpPr>
-          <p:cNvPr id="12" name="Title 1"/>
-          <p:cNvSpPr>
-            <a:spLocks noGrp="1"/>
-          </p:cNvSpPr>
-          <p:nvPr>
-            <p:ph type="title"/>
-          </p:nvPr>
-        </p:nvSpPr>
-        <p:spPr>
-          <a:xfrm>
-            <a:off x="467544" y="764704"/>
-            <a:ext cx="8424936" cy="864096"/>
-          </a:xfrm>
-        </p:spPr>
-        <p:txBody>
-          <a:bodyPr>
-            <a:noAutofit/>
-          </a:bodyPr>
-          <a:lstStyle/>
-          <a:p>
-            <a:pPr algn="ctr"/>
-            <a:r>
-              <a:rPr lang="en-NZ" sz="4400" dirty="0" smtClean="0">
-                <a:solidFill>
-                  <a:schemeClr val="tx1"/>
-                </a:solidFill>
-              </a:rPr>
-              <a:t>Beta vs Single Wave Profile</a:t>
-            </a:r>
-            <a:endParaRPr lang="en-NZ" dirty="0">
-              <a:solidFill>
-                <a:schemeClr val="tx1"/>
-              </a:solidFill>
-            </a:endParaRPr>
-          </a:p>
-        </p:txBody>
-      </p:sp>
-      <p:sp>
-        <p:nvSpPr>
-          <p:cNvPr id="4" name="TextBox 3"/>
-          <p:cNvSpPr txBox="1"/>
-          <p:nvPr/>
-        </p:nvSpPr>
-        <p:spPr>
-          <a:xfrm>
-            <a:off x="1115616" y="1969789"/>
-            <a:ext cx="4871847" cy="369332"/>
-          </a:xfrm>
-          <a:prstGeom prst="rect">
-            <a:avLst/>
-          </a:prstGeom>
-          <a:noFill/>
-        </p:spPr>
-        <p:txBody>
-          <a:bodyPr wrap="none" rtlCol="0">
-            <a:spAutoFit/>
-          </a:bodyPr>
-          <a:lstStyle/>
-          <a:p>
-            <a:pPr marL="285750" indent="-285750">
-              <a:buFont typeface="Arial" panose="020B0604020202020204" pitchFamily="34" charset="0"/>
-              <a:buChar char="•"/>
-            </a:pPr>
-            <a:r>
-              <a:rPr lang="en-NZ" dirty="0" smtClean="0"/>
-              <a:t>Is the wave profile tending towards symmetric?</a:t>
-            </a:r>
-            <a:endParaRPr lang="en-NZ" dirty="0"/>
-          </a:p>
-        </p:txBody>
-      </p:sp>
-      <p:grpSp>
-        <p:nvGrpSpPr>
-          <p:cNvPr id="6" name="Group 5"/>
-          <p:cNvGrpSpPr/>
-          <p:nvPr/>
-        </p:nvGrpSpPr>
-        <p:grpSpPr>
-          <a:xfrm>
-            <a:off x="856865" y="2547570"/>
-            <a:ext cx="7027503" cy="3528392"/>
-            <a:chOff x="395536" y="1844824"/>
-            <a:chExt cx="7859556" cy="3946152"/>
-          </a:xfrm>
-        </p:grpSpPr>
-        <p:pic>
-          <p:nvPicPr>
-            <p:cNvPr id="4098" name="Picture 2"/>
-            <p:cNvPicPr>
-              <a:picLocks noChangeAspect="1" noChangeArrowheads="1"/>
-            </p:cNvPicPr>
-            <p:nvPr/>
-          </p:nvPicPr>
-          <p:blipFill>
-            <a:blip r:embed="rId2" cstate="print">
-              <a:extLst>
-                <a:ext uri="{28A0092B-C50C-407E-A947-70E740481C1C}">
-                  <a14:useLocalDpi xmlns:a14="http://schemas.microsoft.com/office/drawing/2010/main" val="0"/>
-                </a:ext>
-              </a:extLst>
-            </a:blip>
-            <a:srcRect/>
-            <a:stretch>
-              <a:fillRect/>
-            </a:stretch>
-          </p:blipFill>
-          <p:spPr bwMode="auto">
-            <a:xfrm>
-              <a:off x="395536" y="1844824"/>
-              <a:ext cx="7859556" cy="3946152"/>
-            </a:xfrm>
-            <a:prstGeom prst="rect">
-              <a:avLst/>
-            </a:prstGeom>
-            <a:noFill/>
-            <a:ln>
-              <a:noFill/>
-            </a:ln>
-            <a:effectLst/>
-            <a:extLst>
-              <a:ext uri="{909E8E84-426E-40DD-AFC4-6F175D3DCCD1}">
-                <a14:hiddenFill xmlns:a14="http://schemas.microsoft.com/office/drawing/2010/main">
-                  <a:solidFill>
-                    <a:schemeClr val="accent1"/>
-                  </a:solidFill>
-                </a14:hiddenFill>
-              </a:ext>
-              <a:ext uri="{91240B29-F687-4F45-9708-019B960494DF}">
-                <a14:hiddenLine xmlns:a14="http://schemas.microsoft.com/office/drawing/2010/main" w="9525">
-                  <a:solidFill>
-                    <a:schemeClr val="tx1"/>
-                  </a:solidFill>
-                  <a:miter lim="800000"/>
-                  <a:headEnd/>
-                  <a:tailEnd/>
-                </a14:hiddenLine>
-              </a:ext>
-              <a:ext uri="{AF507438-7753-43E0-B8FC-AC1667EBCBE1}">
-                <a14:hiddenEffects xmlns:a14="http://schemas.microsoft.com/office/drawing/2010/main">
-                  <a:effectLst>
-                    <a:outerShdw dist="35921" dir="2700000" algn="ctr" rotWithShape="0">
-                      <a:schemeClr val="bg2"/>
-                    </a:outerShdw>
-                  </a:effectLst>
-                </a14:hiddenEffects>
-              </a:ext>
-            </a:extLst>
-          </p:spPr>
-        </p:pic>
-        <p:sp>
-          <p:nvSpPr>
-            <p:cNvPr id="5" name="Freeform 4"/>
-            <p:cNvSpPr/>
-            <p:nvPr/>
-          </p:nvSpPr>
-          <p:spPr>
-            <a:xfrm>
-              <a:off x="1416050" y="2374900"/>
-              <a:ext cx="6064250" cy="2984500"/>
-            </a:xfrm>
-            <a:custGeom>
-              <a:avLst/>
-              <a:gdLst>
-                <a:gd name="connsiteX0" fmla="*/ 6064250 w 6064250"/>
-                <a:gd name="connsiteY0" fmla="*/ 0 h 2984500"/>
-                <a:gd name="connsiteX1" fmla="*/ 5016500 w 6064250"/>
-                <a:gd name="connsiteY1" fmla="*/ 990600 h 2984500"/>
-                <a:gd name="connsiteX2" fmla="*/ 3740150 w 6064250"/>
-                <a:gd name="connsiteY2" fmla="*/ 1892300 h 2984500"/>
-                <a:gd name="connsiteX3" fmla="*/ 3041650 w 6064250"/>
-                <a:gd name="connsiteY3" fmla="*/ 2292350 h 2984500"/>
-                <a:gd name="connsiteX4" fmla="*/ 2165350 w 6064250"/>
-                <a:gd name="connsiteY4" fmla="*/ 2667000 h 2984500"/>
-                <a:gd name="connsiteX5" fmla="*/ 0 w 6064250"/>
-                <a:gd name="connsiteY5" fmla="*/ 2984500 h 2984500"/>
-                <a:gd name="connsiteX0" fmla="*/ 6064250 w 6064250"/>
-                <a:gd name="connsiteY0" fmla="*/ 0 h 2984500"/>
-                <a:gd name="connsiteX1" fmla="*/ 5016500 w 6064250"/>
-                <a:gd name="connsiteY1" fmla="*/ 990600 h 2984500"/>
-                <a:gd name="connsiteX2" fmla="*/ 3740150 w 6064250"/>
-                <a:gd name="connsiteY2" fmla="*/ 1892300 h 2984500"/>
-                <a:gd name="connsiteX3" fmla="*/ 3041650 w 6064250"/>
-                <a:gd name="connsiteY3" fmla="*/ 2292350 h 2984500"/>
-                <a:gd name="connsiteX4" fmla="*/ 1587500 w 6064250"/>
-                <a:gd name="connsiteY4" fmla="*/ 2774950 h 2984500"/>
-                <a:gd name="connsiteX5" fmla="*/ 0 w 6064250"/>
-                <a:gd name="connsiteY5" fmla="*/ 2984500 h 2984500"/>
-                <a:gd name="connsiteX0" fmla="*/ 6064250 w 6064250"/>
-                <a:gd name="connsiteY0" fmla="*/ 0 h 2984500"/>
-                <a:gd name="connsiteX1" fmla="*/ 5016500 w 6064250"/>
-                <a:gd name="connsiteY1" fmla="*/ 990600 h 2984500"/>
-                <a:gd name="connsiteX2" fmla="*/ 3740150 w 6064250"/>
-                <a:gd name="connsiteY2" fmla="*/ 1892300 h 2984500"/>
-                <a:gd name="connsiteX3" fmla="*/ 3041650 w 6064250"/>
-                <a:gd name="connsiteY3" fmla="*/ 2292350 h 2984500"/>
-                <a:gd name="connsiteX4" fmla="*/ 1587500 w 6064250"/>
-                <a:gd name="connsiteY4" fmla="*/ 2774950 h 2984500"/>
-                <a:gd name="connsiteX5" fmla="*/ 0 w 6064250"/>
-                <a:gd name="connsiteY5" fmla="*/ 2984500 h 2984500"/>
-              </a:gdLst>
-              <a:ahLst/>
-              <a:cxnLst>
-                <a:cxn ang="0">
-                  <a:pos x="connsiteX0" y="connsiteY0"/>
-                </a:cxn>
-                <a:cxn ang="0">
-                  <a:pos x="connsiteX1" y="connsiteY1"/>
-                </a:cxn>
-                <a:cxn ang="0">
-                  <a:pos x="connsiteX2" y="connsiteY2"/>
-                </a:cxn>
-                <a:cxn ang="0">
-                  <a:pos x="connsiteX3" y="connsiteY3"/>
-                </a:cxn>
-                <a:cxn ang="0">
-                  <a:pos x="connsiteX4" y="connsiteY4"/>
-                </a:cxn>
-                <a:cxn ang="0">
-                  <a:pos x="connsiteX5" y="connsiteY5"/>
-                </a:cxn>
-              </a:cxnLst>
-              <a:rect l="l" t="t" r="r" b="b"/>
-              <a:pathLst>
-                <a:path w="6064250" h="2984500">
-                  <a:moveTo>
-                    <a:pt x="6064250" y="0"/>
-                  </a:moveTo>
-                  <a:cubicBezTo>
-                    <a:pt x="5734050" y="337608"/>
-                    <a:pt x="5403850" y="675217"/>
-                    <a:pt x="5016500" y="990600"/>
-                  </a:cubicBezTo>
-                  <a:cubicBezTo>
-                    <a:pt x="4629150" y="1305983"/>
-                    <a:pt x="4069292" y="1675342"/>
-                    <a:pt x="3740150" y="1892300"/>
-                  </a:cubicBezTo>
-                  <a:cubicBezTo>
-                    <a:pt x="3411008" y="2109258"/>
-                    <a:pt x="3400425" y="2145242"/>
-                    <a:pt x="3041650" y="2292350"/>
-                  </a:cubicBezTo>
-                  <a:cubicBezTo>
-                    <a:pt x="2682875" y="2439458"/>
-                    <a:pt x="2113492" y="2665942"/>
-                    <a:pt x="1587500" y="2774950"/>
-                  </a:cubicBezTo>
-                  <a:cubicBezTo>
-                    <a:pt x="1061508" y="2883958"/>
-                    <a:pt x="829204" y="2883429"/>
-                    <a:pt x="0" y="2984500"/>
-                  </a:cubicBezTo>
-                </a:path>
-              </a:pathLst>
-            </a:custGeom>
-            <a:noFill/>
-          </p:spPr>
-          <p:style>
-            <a:lnRef idx="2">
-              <a:schemeClr val="accent1">
-                <a:shade val="50000"/>
-              </a:schemeClr>
-            </a:lnRef>
-            <a:fillRef idx="1">
-              <a:schemeClr val="accent1"/>
-            </a:fillRef>
-            <a:effectRef idx="0">
-              <a:schemeClr val="accent1"/>
-            </a:effectRef>
-            <a:fontRef idx="minor">
-              <a:schemeClr val="lt1"/>
-            </a:fontRef>
-          </p:style>
-          <p:txBody>
-            <a:bodyPr rtlCol="0" anchor="ctr"/>
-            <a:lstStyle/>
-            <a:p>
-              <a:pPr algn="ctr"/>
-              <a:endParaRPr lang="en-NZ"/>
-            </a:p>
-          </p:txBody>
-        </p:sp>
-        <p:sp>
-          <p:nvSpPr>
-            <p:cNvPr id="13" name="Freeform 12"/>
-            <p:cNvSpPr/>
-            <p:nvPr/>
-          </p:nvSpPr>
-          <p:spPr>
-            <a:xfrm>
-              <a:off x="1416050" y="3212976"/>
-              <a:ext cx="6064250" cy="2146424"/>
-            </a:xfrm>
-            <a:custGeom>
-              <a:avLst/>
-              <a:gdLst>
-                <a:gd name="connsiteX0" fmla="*/ 6064250 w 6064250"/>
-                <a:gd name="connsiteY0" fmla="*/ 0 h 2984500"/>
-                <a:gd name="connsiteX1" fmla="*/ 5016500 w 6064250"/>
-                <a:gd name="connsiteY1" fmla="*/ 990600 h 2984500"/>
-                <a:gd name="connsiteX2" fmla="*/ 3740150 w 6064250"/>
-                <a:gd name="connsiteY2" fmla="*/ 1892300 h 2984500"/>
-                <a:gd name="connsiteX3" fmla="*/ 3041650 w 6064250"/>
-                <a:gd name="connsiteY3" fmla="*/ 2292350 h 2984500"/>
-                <a:gd name="connsiteX4" fmla="*/ 2165350 w 6064250"/>
-                <a:gd name="connsiteY4" fmla="*/ 2667000 h 2984500"/>
-                <a:gd name="connsiteX5" fmla="*/ 0 w 6064250"/>
-                <a:gd name="connsiteY5" fmla="*/ 2984500 h 2984500"/>
-                <a:gd name="connsiteX0" fmla="*/ 6064250 w 6064250"/>
-                <a:gd name="connsiteY0" fmla="*/ 0 h 2984500"/>
-                <a:gd name="connsiteX1" fmla="*/ 5016500 w 6064250"/>
-                <a:gd name="connsiteY1" fmla="*/ 990600 h 2984500"/>
-                <a:gd name="connsiteX2" fmla="*/ 3740150 w 6064250"/>
-                <a:gd name="connsiteY2" fmla="*/ 1892300 h 2984500"/>
-                <a:gd name="connsiteX3" fmla="*/ 3041650 w 6064250"/>
-                <a:gd name="connsiteY3" fmla="*/ 2292350 h 2984500"/>
-                <a:gd name="connsiteX4" fmla="*/ 1587500 w 6064250"/>
-                <a:gd name="connsiteY4" fmla="*/ 2774950 h 2984500"/>
-                <a:gd name="connsiteX5" fmla="*/ 0 w 6064250"/>
-                <a:gd name="connsiteY5" fmla="*/ 2984500 h 2984500"/>
-                <a:gd name="connsiteX0" fmla="*/ 6064250 w 6064250"/>
-                <a:gd name="connsiteY0" fmla="*/ 0 h 2984500"/>
-                <a:gd name="connsiteX1" fmla="*/ 5016500 w 6064250"/>
-                <a:gd name="connsiteY1" fmla="*/ 990600 h 2984500"/>
-                <a:gd name="connsiteX2" fmla="*/ 3740150 w 6064250"/>
-                <a:gd name="connsiteY2" fmla="*/ 1892300 h 2984500"/>
-                <a:gd name="connsiteX3" fmla="*/ 3041650 w 6064250"/>
-                <a:gd name="connsiteY3" fmla="*/ 2292350 h 2984500"/>
-                <a:gd name="connsiteX4" fmla="*/ 1587500 w 6064250"/>
-                <a:gd name="connsiteY4" fmla="*/ 2774950 h 2984500"/>
-                <a:gd name="connsiteX5" fmla="*/ 0 w 6064250"/>
-                <a:gd name="connsiteY5" fmla="*/ 2984500 h 2984500"/>
-              </a:gdLst>
-              <a:ahLst/>
-              <a:cxnLst>
-                <a:cxn ang="0">
-                  <a:pos x="connsiteX0" y="connsiteY0"/>
-                </a:cxn>
-                <a:cxn ang="0">
-                  <a:pos x="connsiteX1" y="connsiteY1"/>
-                </a:cxn>
-                <a:cxn ang="0">
-                  <a:pos x="connsiteX2" y="connsiteY2"/>
-                </a:cxn>
-                <a:cxn ang="0">
-                  <a:pos x="connsiteX3" y="connsiteY3"/>
-                </a:cxn>
-                <a:cxn ang="0">
-                  <a:pos x="connsiteX4" y="connsiteY4"/>
-                </a:cxn>
-                <a:cxn ang="0">
-                  <a:pos x="connsiteX5" y="connsiteY5"/>
-                </a:cxn>
-              </a:cxnLst>
-              <a:rect l="l" t="t" r="r" b="b"/>
-              <a:pathLst>
-                <a:path w="6064250" h="2984500">
-                  <a:moveTo>
-                    <a:pt x="6064250" y="0"/>
-                  </a:moveTo>
-                  <a:cubicBezTo>
-                    <a:pt x="5734050" y="337608"/>
-                    <a:pt x="5403850" y="675217"/>
-                    <a:pt x="5016500" y="990600"/>
-                  </a:cubicBezTo>
-                  <a:cubicBezTo>
-                    <a:pt x="4629150" y="1305983"/>
-                    <a:pt x="4069292" y="1675342"/>
-                    <a:pt x="3740150" y="1892300"/>
-                  </a:cubicBezTo>
-                  <a:cubicBezTo>
-                    <a:pt x="3411008" y="2109258"/>
-                    <a:pt x="3400425" y="2145242"/>
-                    <a:pt x="3041650" y="2292350"/>
-                  </a:cubicBezTo>
-                  <a:cubicBezTo>
-                    <a:pt x="2682875" y="2439458"/>
-                    <a:pt x="2113492" y="2665942"/>
-                    <a:pt x="1587500" y="2774950"/>
-                  </a:cubicBezTo>
-                  <a:cubicBezTo>
-                    <a:pt x="1061508" y="2883958"/>
-                    <a:pt x="829204" y="2883429"/>
-                    <a:pt x="0" y="2984500"/>
-                  </a:cubicBezTo>
-                </a:path>
-              </a:pathLst>
-            </a:custGeom>
-            <a:noFill/>
-          </p:spPr>
-          <p:style>
-            <a:lnRef idx="2">
-              <a:schemeClr val="accent1">
-                <a:shade val="50000"/>
-              </a:schemeClr>
-            </a:lnRef>
-            <a:fillRef idx="1">
-              <a:schemeClr val="accent1"/>
-            </a:fillRef>
-            <a:effectRef idx="0">
-              <a:schemeClr val="accent1"/>
-            </a:effectRef>
-            <a:fontRef idx="minor">
-              <a:schemeClr val="lt1"/>
-            </a:fontRef>
-          </p:style>
-          <p:txBody>
-            <a:bodyPr rtlCol="0" anchor="ctr"/>
-            <a:lstStyle/>
-            <a:p>
-              <a:pPr algn="ctr"/>
-              <a:endParaRPr lang="en-NZ"/>
-            </a:p>
-          </p:txBody>
-        </p:sp>
-      </p:grpSp>
-    </p:spTree>
-    <p:extLst>
-      <p:ext uri="{BB962C8B-B14F-4D97-AF65-F5344CB8AC3E}">
-        <p14:creationId xmlns:p14="http://schemas.microsoft.com/office/powerpoint/2010/main" val="1386344617"/>
-      </p:ext>
-    </p:extLst>
-  </p:cSld>
-  <p:clrMapOvr>
-    <a:masterClrMapping/>
-  </p:clrMapOvr>
-  <mc:AlternateContent xmlns:mc="http://schemas.openxmlformats.org/markup-compatibility/2006">
-    <mc:Choice xmlns:p14="http://schemas.microsoft.com/office/powerpoint/2010/main" Requires="p14">
-      <p:transition p14:dur="0"/>
-    </mc:Choice>
-    <mc:Fallback>
-      <p:transition/>
-    </mc:Fallback>
-  </mc:AlternateContent>
   <p:timing>
     <p:tnLst>
       <p:par>
@@ -4747,8 +3844,8 @@
           </a:p>
         </p:txBody>
       </p:sp>
-      <mc:AlternateContent xmlns:mc="http://schemas.openxmlformats.org/markup-compatibility/2006">
-        <mc:Choice xmlns:a14="http://schemas.microsoft.com/office/drawing/2010/main" Requires="a14">
+      <mc:AlternateContent xmlns:mc="http://schemas.openxmlformats.org/markup-compatibility/2006" xmlns:a14="http://schemas.microsoft.com/office/drawing/2010/main">
+        <mc:Choice Requires="a14">
           <p:sp>
             <p:nvSpPr>
               <p:cNvPr id="29" name="TextBox 28"/>
@@ -4799,7 +3896,7 @@
             </p:txBody>
           </p:sp>
         </mc:Choice>
-        <mc:Fallback>
+        <mc:Fallback xmlns="">
           <p:sp>
             <p:nvSpPr>
               <p:cNvPr id="29" name="TextBox 28"/>
@@ -4848,11 +3945,11 @@
   <p:clrMapOvr>
     <a:masterClrMapping/>
   </p:clrMapOvr>
-  <mc:AlternateContent xmlns:mc="http://schemas.openxmlformats.org/markup-compatibility/2006">
-    <mc:Choice xmlns:p14="http://schemas.microsoft.com/office/powerpoint/2010/main" Requires="p14">
+  <mc:AlternateContent xmlns:mc="http://schemas.openxmlformats.org/markup-compatibility/2006" xmlns:p14="http://schemas.microsoft.com/office/powerpoint/2010/main">
+    <mc:Choice Requires="p14">
       <p:transition p14:dur="0"/>
     </mc:Choice>
-    <mc:Fallback>
+    <mc:Fallback xmlns="">
       <p:transition/>
     </mc:Fallback>
   </mc:AlternateContent>
@@ -5281,13 +4378,13 @@
   <p:clrMapOvr>
     <a:masterClrMapping/>
   </p:clrMapOvr>
-  <mc:AlternateContent xmlns:mc="http://schemas.openxmlformats.org/markup-compatibility/2006">
-    <mc:Choice xmlns:p14="http://schemas.microsoft.com/office/powerpoint/2010/main" Requires="p14">
+  <mc:AlternateContent xmlns:mc="http://schemas.openxmlformats.org/markup-compatibility/2006" xmlns:p14="http://schemas.microsoft.com/office/powerpoint/2010/main">
+    <mc:Choice Requires="p14">
       <p:transition spd="med" p14:dur="700">
         <p:fade/>
       </p:transition>
     </mc:Choice>
-    <mc:Fallback>
+    <mc:Fallback xmlns="">
       <p:transition spd="med">
         <p:fade/>
       </p:transition>
@@ -5411,15 +4508,7 @@
                   <a:schemeClr val="tx1"/>
                 </a:solidFill>
               </a:rPr>
-              <a:t> vs</a:t>
-            </a:r>
-            <a:r>
-              <a:rPr lang="en-NZ" sz="4400" dirty="0" smtClean="0">
-                <a:solidFill>
-                  <a:schemeClr val="tx1"/>
-                </a:solidFill>
-              </a:rPr>
-              <a:t> Beta </a:t>
+              <a:t> vs Beta </a:t>
             </a:r>
             <a:endParaRPr lang="en-NZ" dirty="0">
               <a:solidFill>
@@ -5429,8 +4518,8 @@
           </a:p>
         </p:txBody>
       </p:sp>
-      <mc:AlternateContent xmlns:mc="http://schemas.openxmlformats.org/markup-compatibility/2006">
-        <mc:Choice xmlns:a14="http://schemas.microsoft.com/office/drawing/2010/main" Requires="a14">
+      <mc:AlternateContent xmlns:mc="http://schemas.openxmlformats.org/markup-compatibility/2006" xmlns:a14="http://schemas.microsoft.com/office/drawing/2010/main">
+        <mc:Choice Requires="a14">
           <p:sp>
             <p:nvSpPr>
               <p:cNvPr id="3" name="TextBox 2"/>
@@ -5726,7 +4815,7 @@
             </p:txBody>
           </p:sp>
         </mc:Choice>
-        <mc:Fallback>
+        <mc:Fallback xmlns="">
           <p:sp>
             <p:nvSpPr>
               <p:cNvPr id="3" name="TextBox 2"/>
@@ -5839,11 +4928,11 @@
   <p:clrMapOvr>
     <a:masterClrMapping/>
   </p:clrMapOvr>
-  <mc:AlternateContent xmlns:mc="http://schemas.openxmlformats.org/markup-compatibility/2006">
-    <mc:Choice xmlns:p14="http://schemas.microsoft.com/office/powerpoint/2010/main" Requires="p14">
+  <mc:AlternateContent xmlns:mc="http://schemas.openxmlformats.org/markup-compatibility/2006" xmlns:p14="http://schemas.microsoft.com/office/powerpoint/2010/main">
+    <mc:Choice Requires="p14">
       <p:transition p14:dur="0"/>
     </mc:Choice>
-    <mc:Fallback>
+    <mc:Fallback xmlns="">
       <p:transition/>
     </mc:Fallback>
   </mc:AlternateContent>
@@ -6246,8 +5335,8 @@
           </a:p>
         </p:txBody>
       </p:sp>
-      <mc:AlternateContent xmlns:mc="http://schemas.openxmlformats.org/markup-compatibility/2006">
-        <mc:Choice xmlns:a14="http://schemas.microsoft.com/office/drawing/2010/main" Requires="a14">
+      <mc:AlternateContent xmlns:mc="http://schemas.openxmlformats.org/markup-compatibility/2006" xmlns:a14="http://schemas.microsoft.com/office/drawing/2010/main">
+        <mc:Choice Requires="a14">
           <p:sp>
             <p:nvSpPr>
               <p:cNvPr id="29" name="TextBox 28"/>
@@ -6298,7 +5387,7 @@
             </p:txBody>
           </p:sp>
         </mc:Choice>
-        <mc:Fallback>
+        <mc:Fallback xmlns="">
           <p:sp>
             <p:nvSpPr>
               <p:cNvPr id="29" name="TextBox 28"/>
@@ -6347,11 +5436,11 @@
   <p:clrMapOvr>
     <a:masterClrMapping/>
   </p:clrMapOvr>
-  <mc:AlternateContent xmlns:mc="http://schemas.openxmlformats.org/markup-compatibility/2006">
-    <mc:Choice xmlns:p14="http://schemas.microsoft.com/office/powerpoint/2010/main" Requires="p14">
+  <mc:AlternateContent xmlns:mc="http://schemas.openxmlformats.org/markup-compatibility/2006" xmlns:p14="http://schemas.microsoft.com/office/powerpoint/2010/main">
+    <mc:Choice Requires="p14">
       <p:transition p14:dur="0"/>
     </mc:Choice>
-    <mc:Fallback>
+    <mc:Fallback xmlns="">
       <p:transition/>
     </mc:Fallback>
   </mc:AlternateContent>
@@ -6705,15 +5794,7 @@
                   <a:schemeClr val="tx1"/>
                 </a:solidFill>
               </a:rPr>
-              <a:t> vs</a:t>
-            </a:r>
-            <a:r>
-              <a:rPr lang="en-NZ" sz="4400" dirty="0" smtClean="0">
-                <a:solidFill>
-                  <a:schemeClr val="tx1"/>
-                </a:solidFill>
-              </a:rPr>
-              <a:t> Beta </a:t>
+              <a:t> vs Beta </a:t>
             </a:r>
             <a:endParaRPr lang="en-NZ" dirty="0">
               <a:solidFill>
@@ -6984,6 +6065,99 @@
           </p:txBody>
         </p:sp>
       </p:grpSp>
+      <p:grpSp>
+        <p:nvGrpSpPr>
+          <p:cNvPr id="11" name="Group 10"/>
+          <p:cNvGrpSpPr/>
+          <p:nvPr/>
+        </p:nvGrpSpPr>
+        <p:grpSpPr>
+          <a:xfrm>
+            <a:off x="7308304" y="794321"/>
+            <a:ext cx="1093258" cy="1050503"/>
+            <a:chOff x="7308304" y="794321"/>
+            <a:chExt cx="1093258" cy="1050503"/>
+          </a:xfrm>
+        </p:grpSpPr>
+        <p:sp>
+          <p:nvSpPr>
+            <p:cNvPr id="8" name="Multiply 7"/>
+            <p:cNvSpPr/>
+            <p:nvPr/>
+          </p:nvSpPr>
+          <p:spPr>
+            <a:xfrm>
+              <a:off x="7308304" y="794321"/>
+              <a:ext cx="849913" cy="762471"/>
+            </a:xfrm>
+            <a:prstGeom prst="mathMultiply">
+              <a:avLst/>
+            </a:prstGeom>
+          </p:spPr>
+          <p:style>
+            <a:lnRef idx="2">
+              <a:schemeClr val="accent1">
+                <a:shade val="50000"/>
+              </a:schemeClr>
+            </a:lnRef>
+            <a:fillRef idx="1">
+              <a:schemeClr val="accent1"/>
+            </a:fillRef>
+            <a:effectRef idx="0">
+              <a:schemeClr val="accent1"/>
+            </a:effectRef>
+            <a:fontRef idx="minor">
+              <a:schemeClr val="lt1"/>
+            </a:fontRef>
+          </p:style>
+          <p:txBody>
+            <a:bodyPr rtlCol="0" anchor="ctr"/>
+            <a:lstStyle/>
+            <a:p>
+              <a:pPr algn="ctr"/>
+              <a:endParaRPr lang="en-NZ"/>
+            </a:p>
+          </p:txBody>
+        </p:sp>
+        <p:sp>
+          <p:nvSpPr>
+            <p:cNvPr id="9" name="TextBox 8"/>
+            <p:cNvSpPr txBox="1"/>
+            <p:nvPr/>
+          </p:nvSpPr>
+          <p:spPr>
+            <a:xfrm>
+              <a:off x="7511190" y="1475492"/>
+              <a:ext cx="890372" cy="369332"/>
+            </a:xfrm>
+            <a:prstGeom prst="rect">
+              <a:avLst/>
+            </a:prstGeom>
+            <a:noFill/>
+          </p:spPr>
+          <p:txBody>
+            <a:bodyPr wrap="none" rtlCol="0">
+              <a:spAutoFit/>
+            </a:bodyPr>
+            <a:lstStyle/>
+            <a:p>
+              <a:r>
+                <a:rPr lang="en-NZ" dirty="0" smtClean="0">
+                  <a:solidFill>
+                    <a:schemeClr val="accent1"/>
+                  </a:solidFill>
+                </a:rPr>
+                <a:t>Not Yet</a:t>
+              </a:r>
+              <a:endParaRPr lang="en-NZ" dirty="0">
+                <a:solidFill>
+                  <a:schemeClr val="accent1"/>
+                </a:solidFill>
+              </a:endParaRPr>
+            </a:p>
+          </p:txBody>
+        </p:sp>
+      </p:grpSp>
     </p:spTree>
     <p:extLst>
       <p:ext uri="{BB962C8B-B14F-4D97-AF65-F5344CB8AC3E}">
@@ -6994,11 +6168,11 @@
   <p:clrMapOvr>
     <a:masterClrMapping/>
   </p:clrMapOvr>
-  <mc:AlternateContent xmlns:mc="http://schemas.openxmlformats.org/markup-compatibility/2006">
-    <mc:Choice xmlns:p14="http://schemas.microsoft.com/office/powerpoint/2010/main" Requires="p14">
+  <mc:AlternateContent xmlns:mc="http://schemas.openxmlformats.org/markup-compatibility/2006" xmlns:p14="http://schemas.microsoft.com/office/powerpoint/2010/main">
+    <mc:Choice Requires="p14">
       <p:transition p14:dur="0"/>
     </mc:Choice>
-    <mc:Fallback>
+    <mc:Fallback xmlns="">
       <p:transition/>
     </mc:Fallback>
   </mc:AlternateContent>
@@ -7129,14 +6303,67 @@
                             </p:stCondLst>
                             <p:childTnLst>
                               <p:par>
-                                <p:cTn id="15" presetID="9" presetClass="emph" presetSubtype="0" nodeType="clickEffect">
+                                <p:cTn id="15" presetID="10" presetClass="entr" presetSubtype="0" fill="hold" nodeType="clickEffect">
+                                  <p:stCondLst>
+                                    <p:cond delay="0"/>
+                                  </p:stCondLst>
+                                  <p:childTnLst>
+                                    <p:set>
+                                      <p:cBhvr>
+                                        <p:cTn id="16" dur="1" fill="hold">
+                                          <p:stCondLst>
+                                            <p:cond delay="0"/>
+                                          </p:stCondLst>
+                                        </p:cTn>
+                                        <p:tgtEl>
+                                          <p:spTgt spid="11"/>
+                                        </p:tgtEl>
+                                        <p:attrNameLst>
+                                          <p:attrName>style.visibility</p:attrName>
+                                        </p:attrNameLst>
+                                      </p:cBhvr>
+                                      <p:to>
+                                        <p:strVal val="visible"/>
+                                      </p:to>
+                                    </p:set>
+                                    <p:animEffect transition="in" filter="fade">
+                                      <p:cBhvr>
+                                        <p:cTn id="17" dur="500"/>
+                                        <p:tgtEl>
+                                          <p:spTgt spid="11"/>
+                                        </p:tgtEl>
+                                      </p:cBhvr>
+                                    </p:animEffect>
+                                  </p:childTnLst>
+                                </p:cTn>
+                              </p:par>
+                            </p:childTnLst>
+                          </p:cTn>
+                        </p:par>
+                      </p:childTnLst>
+                    </p:cTn>
+                  </p:par>
+                  <p:par>
+                    <p:cTn id="18" fill="hold">
+                      <p:stCondLst>
+                        <p:cond delay="indefinite"/>
+                      </p:stCondLst>
+                      <p:childTnLst>
+                        <p:par>
+                          <p:cTn id="19" fill="hold">
+                            <p:stCondLst>
+                              <p:cond delay="0"/>
+                            </p:stCondLst>
+                            <p:childTnLst>
+                              <p:par>
+                                <p:cTn id="20" presetID="9" presetClass="emph" presetSubtype="0" nodeType="clickEffect">
                                   <p:stCondLst>
                                     <p:cond delay="0"/>
                                   </p:stCondLst>
                                   <p:childTnLst>
                                     <p:set>
                                       <p:cBhvr rctx="PPT">
-                                        <p:cTn id="16" dur="indefinite"/>
+                                        <p:cTn id="21" dur="indefinite"/>
                                         <p:tgtEl>
                                           <p:spTgt spid="5125"/>
                                         </p:tgtEl>
@@ -7150,7 +6377,7 @@
                                     </p:set>
                                     <p:animEffect filter="image" prLst="opacity: 0.2">
                                       <p:cBhvr rctx="IE">
-                                        <p:cTn id="17" dur="indefinite"/>
+                                        <p:cTn id="22" dur="indefinite"/>
                                         <p:tgtEl>
                                           <p:spTgt spid="5125"/>
                                         </p:tgtEl>
@@ -7160,14 +6387,14 @@
                                 </p:cTn>
                               </p:par>
                               <p:par>
-                                <p:cTn id="18" presetID="10" presetClass="exit" presetSubtype="0" fill="hold" grpId="1" nodeType="withEffect">
+                                <p:cTn id="23" presetID="10" presetClass="exit" presetSubtype="0" fill="hold" grpId="1" nodeType="withEffect">
                                   <p:stCondLst>
                                     <p:cond delay="0"/>
                                   </p:stCondLst>
                                   <p:childTnLst>
                                     <p:animEffect transition="out" filter="fade">
                                       <p:cBhvr>
-                                        <p:cTn id="19" dur="500"/>
+                                        <p:cTn id="24" dur="500"/>
                                         <p:tgtEl>
                                           <p:spTgt spid="3"/>
                                         </p:tgtEl>
@@ -7175,7 +6402,7 @@
                                     </p:animEffect>
                                     <p:set>
                                       <p:cBhvr>
-                                        <p:cTn id="20" dur="1" fill="hold">
+                                        <p:cTn id="25" dur="1" fill="hold">
                                           <p:stCondLst>
                                             <p:cond delay="499"/>
                                           </p:stCondLst>
@@ -7195,14 +6422,14 @@
                                 </p:cTn>
                               </p:par>
                               <p:par>
-                                <p:cTn id="21" presetID="10" presetClass="exit" presetSubtype="0" fill="hold" nodeType="withEffect">
+                                <p:cTn id="26" presetID="10" presetClass="exit" presetSubtype="0" fill="hold" nodeType="withEffect">
                                   <p:stCondLst>
                                     <p:cond delay="0"/>
                                   </p:stCondLst>
                                   <p:childTnLst>
                                     <p:animEffect transition="out" filter="fade">
                                       <p:cBhvr>
-                                        <p:cTn id="22" dur="500"/>
+                                        <p:cTn id="27" dur="500"/>
                                         <p:tgtEl>
                                           <p:spTgt spid="7"/>
                                         </p:tgtEl>
@@ -7210,7 +6437,7 @@
                                     </p:animEffect>
                                     <p:set>
                                       <p:cBhvr>
-                                        <p:cTn id="23" dur="1" fill="hold">
+                                        <p:cTn id="28" dur="1" fill="hold">
                                           <p:stCondLst>
                                             <p:cond delay="499"/>
                                           </p:stCondLst>
@@ -7229,33 +6456,59 @@
                                   </p:childTnLst>
                                 </p:cTn>
                               </p:par>
+                              <p:par>
+                                <p:cTn id="29" presetID="10" presetClass="exit" presetSubtype="0" fill="hold" nodeType="withEffect">
+                                  <p:stCondLst>
+                                    <p:cond delay="0"/>
+                                  </p:stCondLst>
+                                  <p:childTnLst>
+                                    <p:animEffect transition="out" filter="fade">
+                                      <p:cBhvr>
+                                        <p:cTn id="30" dur="500"/>
+                                        <p:tgtEl>
+                                          <p:spTgt spid="11"/>
+                                        </p:tgtEl>
+                                      </p:cBhvr>
+                                    </p:animEffect>
+                                    <p:set>
+                                      <p:cBhvr>
+                                        <p:cTn id="31" dur="1" fill="hold">
+                                          <p:stCondLst>
+                                            <p:cond delay="499"/>
+                                          </p:stCondLst>
+                                        </p:cTn>
+                                        <p:tgtEl>
+                                          <p:spTgt spid="11"/>
+                                        </p:tgtEl>
+                                        <p:attrNameLst>
+                                          <p:attrName>style.visibility</p:attrName>
+                                        </p:attrNameLst>
+                                      </p:cBhvr>
+                                      <p:to>
+                                        <p:strVal val="hidden"/>
+                                      </p:to>
+                                    </p:set>
+                                  </p:childTnLst>
+                                </p:cTn>
+                              </p:par>
                             </p:childTnLst>
                           </p:cTn>
                         </p:par>
-                      </p:childTnLst>
-                    </p:cTn>
-                  </p:par>
-                  <p:par>
-                    <p:cTn id="24" fill="hold">
-                      <p:stCondLst>
-                        <p:cond delay="indefinite"/>
-                      </p:stCondLst>
-                      <p:childTnLst>
                         <p:par>
-                          <p:cTn id="25" fill="hold">
+                          <p:cTn id="32" fill="hold">
                             <p:stCondLst>
-                              <p:cond delay="0"/>
+                              <p:cond delay="500"/>
                             </p:stCondLst>
                             <p:childTnLst>
                               <p:par>
-                                <p:cTn id="26" presetID="10" presetClass="entr" presetSubtype="0" fill="hold" grpId="0" nodeType="clickEffect">
+                                <p:cTn id="33" presetID="10" presetClass="entr" presetSubtype="0" fill="hold" grpId="0" nodeType="afterEffect">
                                   <p:stCondLst>
                                     <p:cond delay="0"/>
                                   </p:stCondLst>
                                   <p:childTnLst>
                                     <p:set>
                                       <p:cBhvr>
-                                        <p:cTn id="27" dur="1" fill="hold">
+                                        <p:cTn id="34" dur="1" fill="hold">
                                           <p:stCondLst>
                                             <p:cond delay="0"/>
                                           </p:stCondLst>
@@ -7273,7 +6526,7 @@
                                     </p:set>
                                     <p:animEffect transition="in" filter="fade">
                                       <p:cBhvr>
-                                        <p:cTn id="28" dur="500"/>
+                                        <p:cTn id="35" dur="500"/>
                                         <p:tgtEl>
                                           <p:spTgt spid="2"/>
                                         </p:tgtEl>
@@ -7289,26 +6542,26 @@
                     </p:cTn>
                   </p:par>
                   <p:par>
-                    <p:cTn id="29" fill="hold">
+                    <p:cTn id="36" fill="hold">
                       <p:stCondLst>
                         <p:cond delay="indefinite"/>
                       </p:stCondLst>
                       <p:childTnLst>
                         <p:par>
-                          <p:cTn id="30" fill="hold">
+                          <p:cTn id="37" fill="hold">
                             <p:stCondLst>
                               <p:cond delay="0"/>
                             </p:stCondLst>
                             <p:childTnLst>
                               <p:par>
-                                <p:cTn id="31" presetID="10" presetClass="entr" presetSubtype="0" fill="hold" grpId="0" nodeType="clickEffect">
+                                <p:cTn id="38" presetID="10" presetClass="entr" presetSubtype="0" fill="hold" grpId="0" nodeType="clickEffect">
                                   <p:stCondLst>
                                     <p:cond delay="0"/>
                                   </p:stCondLst>
                                   <p:childTnLst>
                                     <p:set>
                                       <p:cBhvr>
-                                        <p:cTn id="32" dur="1" fill="hold">
+                                        <p:cTn id="39" dur="1" fill="hold">
                                           <p:stCondLst>
                                             <p:cond delay="0"/>
                                           </p:stCondLst>
@@ -7326,7 +6579,7 @@
                                     </p:set>
                                     <p:animEffect transition="in" filter="fade">
                                       <p:cBhvr>
-                                        <p:cTn id="33" dur="500"/>
+                                        <p:cTn id="40" dur="500"/>
                                         <p:tgtEl>
                                           <p:spTgt spid="6"/>
                                         </p:tgtEl>
@@ -7373,6 +6626,1322 @@
 </file>
 
 <file path=ppt/slides/slide7.xml><?xml version="1.0" encoding="utf-8"?>
+<p:sld xmlns:a="http://schemas.openxmlformats.org/drawingml/2006/main" xmlns:r="http://schemas.openxmlformats.org/officeDocument/2006/relationships" xmlns:p="http://schemas.openxmlformats.org/presentationml/2006/main">
+  <p:cSld>
+    <p:spTree>
+      <p:nvGrpSpPr>
+        <p:cNvPr id="1" name=""/>
+        <p:cNvGrpSpPr/>
+        <p:nvPr/>
+      </p:nvGrpSpPr>
+      <p:grpSpPr>
+        <a:xfrm>
+          <a:off x="0" y="0"/>
+          <a:ext cx="0" cy="0"/>
+          <a:chOff x="0" y="0"/>
+          <a:chExt cx="0" cy="0"/>
+        </a:xfrm>
+      </p:grpSpPr>
+      <p:grpSp>
+        <p:nvGrpSpPr>
+          <p:cNvPr id="4" name="Group 3"/>
+          <p:cNvGrpSpPr/>
+          <p:nvPr/>
+        </p:nvGrpSpPr>
+        <p:grpSpPr>
+          <a:xfrm>
+            <a:off x="1905000" y="1428750"/>
+            <a:ext cx="5334000" cy="4000500"/>
+            <a:chOff x="0" y="0"/>
+            <a:chExt cx="5334000" cy="4000500"/>
+          </a:xfrm>
+        </p:grpSpPr>
+        <p:pic>
+          <p:nvPicPr>
+            <p:cNvPr id="5" name="Picture 4"/>
+            <p:cNvPicPr>
+              <a:picLocks noChangeAspect="1"/>
+            </p:cNvPicPr>
+            <p:nvPr/>
+          </p:nvPicPr>
+          <p:blipFill>
+            <a:blip r:embed="rId2">
+              <a:extLst>
+                <a:ext uri="{28A0092B-C50C-407E-A947-70E740481C1C}">
+                  <a14:useLocalDpi xmlns:a14="http://schemas.microsoft.com/office/drawing/2010/main" val="0"/>
+                </a:ext>
+              </a:extLst>
+            </a:blip>
+            <a:stretch>
+              <a:fillRect/>
+            </a:stretch>
+          </p:blipFill>
+          <p:spPr>
+            <a:xfrm>
+              <a:off x="0" y="0"/>
+              <a:ext cx="5334000" cy="4000500"/>
+            </a:xfrm>
+            <a:prstGeom prst="rect">
+              <a:avLst/>
+            </a:prstGeom>
+          </p:spPr>
+        </p:pic>
+        <p:grpSp>
+          <p:nvGrpSpPr>
+            <p:cNvPr id="6" name="Group 5"/>
+            <p:cNvGrpSpPr/>
+            <p:nvPr/>
+          </p:nvGrpSpPr>
+          <p:grpSpPr>
+            <a:xfrm>
+              <a:off x="952500" y="309564"/>
+              <a:ext cx="3990975" cy="3014344"/>
+              <a:chOff x="0" y="0"/>
+              <a:chExt cx="3990975" cy="3014663"/>
+            </a:xfrm>
+          </p:grpSpPr>
+          <p:grpSp>
+            <p:nvGrpSpPr>
+              <p:cNvPr id="7" name="Group 6"/>
+              <p:cNvGrpSpPr/>
+              <p:nvPr/>
+            </p:nvGrpSpPr>
+            <p:grpSpPr>
+              <a:xfrm>
+                <a:off x="0" y="1023938"/>
+                <a:ext cx="2343150" cy="1990725"/>
+                <a:chOff x="0" y="0"/>
+                <a:chExt cx="2343150" cy="1990725"/>
+              </a:xfrm>
+            </p:grpSpPr>
+            <p:sp>
+              <p:nvSpPr>
+                <p:cNvPr id="20" name="Text Box 2"/>
+                <p:cNvSpPr txBox="1">
+                  <a:spLocks noChangeArrowheads="1"/>
+                </p:cNvSpPr>
+                <p:nvPr/>
+              </p:nvSpPr>
+              <p:spPr bwMode="auto">
+                <a:xfrm>
+                  <a:off x="0" y="1552575"/>
+                  <a:ext cx="276225" cy="438150"/>
+                </a:xfrm>
+                <a:prstGeom prst="rect">
+                  <a:avLst/>
+                </a:prstGeom>
+                <a:noFill/>
+                <a:ln w="9525">
+                  <a:noFill/>
+                  <a:miter lim="800000"/>
+                  <a:headEnd/>
+                  <a:tailEnd/>
+                </a:ln>
+              </p:spPr>
+              <p:txBody>
+                <a:bodyPr rot="0" vert="horz" wrap="square" lIns="91440" tIns="45720" rIns="91440" bIns="45720" anchor="t" anchorCtr="0">
+                  <a:spAutoFit/>
+                </a:bodyPr>
+                <a:lstStyle/>
+                <a:p>
+                  <a:pPr>
+                    <a:lnSpc>
+                      <a:spcPct val="115000"/>
+                    </a:lnSpc>
+                    <a:spcAft>
+                      <a:spcPts val="1000"/>
+                    </a:spcAft>
+                  </a:pPr>
+                  <a:r>
+                    <a:rPr lang="en-NZ" sz="1100" b="1">
+                      <a:ln w="9004" cap="flat" cmpd="sng" algn="ctr">
+                        <a:solidFill>
+                          <a:srgbClr val="D73A36"/>
+                        </a:solidFill>
+                        <a:prstDash val="solid"/>
+                        <a:miter lim="0"/>
+                      </a:ln>
+                      <a:noFill/>
+                      <a:effectLst>
+                        <a:outerShdw blurRad="25502" dist="23000" dir="7020000" algn="tl">
+                          <a:srgbClr val="000000">
+                            <a:alpha val="50000"/>
+                          </a:srgbClr>
+                        </a:outerShdw>
+                      </a:effectLst>
+                      <a:latin typeface="Calibri"/>
+                      <a:ea typeface="Calibri"/>
+                      <a:cs typeface="Times New Roman"/>
+                    </a:rPr>
+                    <a:t>1</a:t>
+                  </a:r>
+                  <a:endParaRPr lang="en-NZ" sz="1100">
+                    <a:effectLst/>
+                    <a:latin typeface="Calibri"/>
+                    <a:ea typeface="Calibri"/>
+                    <a:cs typeface="Times New Roman"/>
+                  </a:endParaRPr>
+                </a:p>
+              </p:txBody>
+            </p:sp>
+            <p:sp>
+              <p:nvSpPr>
+                <p:cNvPr id="21" name="Text Box 2"/>
+                <p:cNvSpPr txBox="1">
+                  <a:spLocks noChangeArrowheads="1"/>
+                </p:cNvSpPr>
+                <p:nvPr/>
+              </p:nvSpPr>
+              <p:spPr bwMode="auto">
+                <a:xfrm>
+                  <a:off x="581025" y="1157287"/>
+                  <a:ext cx="276225" cy="438150"/>
+                </a:xfrm>
+                <a:prstGeom prst="rect">
+                  <a:avLst/>
+                </a:prstGeom>
+                <a:noFill/>
+                <a:ln w="9525">
+                  <a:noFill/>
+                  <a:miter lim="800000"/>
+                  <a:headEnd/>
+                  <a:tailEnd/>
+                </a:ln>
+              </p:spPr>
+              <p:txBody>
+                <a:bodyPr rot="0" vert="horz" wrap="square" lIns="91440" tIns="45720" rIns="91440" bIns="45720" anchor="t" anchorCtr="0">
+                  <a:spAutoFit/>
+                </a:bodyPr>
+                <a:lstStyle/>
+                <a:p>
+                  <a:pPr>
+                    <a:lnSpc>
+                      <a:spcPct val="115000"/>
+                    </a:lnSpc>
+                    <a:spcAft>
+                      <a:spcPts val="1000"/>
+                    </a:spcAft>
+                  </a:pPr>
+                  <a:r>
+                    <a:rPr lang="en-NZ" sz="1100" b="1">
+                      <a:ln w="9004" cap="flat" cmpd="sng" algn="ctr">
+                        <a:solidFill>
+                          <a:srgbClr val="D73A36"/>
+                        </a:solidFill>
+                        <a:prstDash val="solid"/>
+                        <a:miter lim="0"/>
+                      </a:ln>
+                      <a:noFill/>
+                      <a:effectLst>
+                        <a:outerShdw blurRad="25502" dist="23000" dir="7020000" algn="tl">
+                          <a:srgbClr val="000000">
+                            <a:alpha val="50000"/>
+                          </a:srgbClr>
+                        </a:outerShdw>
+                      </a:effectLst>
+                      <a:latin typeface="Calibri"/>
+                      <a:ea typeface="Calibri"/>
+                      <a:cs typeface="Times New Roman"/>
+                    </a:rPr>
+                    <a:t>2</a:t>
+                  </a:r>
+                  <a:endParaRPr lang="en-NZ" sz="1100">
+                    <a:effectLst/>
+                    <a:latin typeface="Calibri"/>
+                    <a:ea typeface="Calibri"/>
+                    <a:cs typeface="Times New Roman"/>
+                  </a:endParaRPr>
+                </a:p>
+              </p:txBody>
+            </p:sp>
+            <p:sp>
+              <p:nvSpPr>
+                <p:cNvPr id="22" name="Text Box 2"/>
+                <p:cNvSpPr txBox="1">
+                  <a:spLocks noChangeArrowheads="1"/>
+                </p:cNvSpPr>
+                <p:nvPr/>
+              </p:nvSpPr>
+              <p:spPr bwMode="auto">
+                <a:xfrm>
+                  <a:off x="981075" y="795337"/>
+                  <a:ext cx="276225" cy="438150"/>
+                </a:xfrm>
+                <a:prstGeom prst="rect">
+                  <a:avLst/>
+                </a:prstGeom>
+                <a:noFill/>
+                <a:ln w="9525">
+                  <a:noFill/>
+                  <a:miter lim="800000"/>
+                  <a:headEnd/>
+                  <a:tailEnd/>
+                </a:ln>
+              </p:spPr>
+              <p:txBody>
+                <a:bodyPr rot="0" vert="horz" wrap="square" lIns="91440" tIns="45720" rIns="91440" bIns="45720" anchor="t" anchorCtr="0">
+                  <a:spAutoFit/>
+                </a:bodyPr>
+                <a:lstStyle/>
+                <a:p>
+                  <a:pPr>
+                    <a:lnSpc>
+                      <a:spcPct val="115000"/>
+                    </a:lnSpc>
+                    <a:spcAft>
+                      <a:spcPts val="1000"/>
+                    </a:spcAft>
+                  </a:pPr>
+                  <a:r>
+                    <a:rPr lang="en-NZ" sz="1100" b="1">
+                      <a:ln w="9004" cap="flat" cmpd="sng" algn="ctr">
+                        <a:solidFill>
+                          <a:srgbClr val="D73A36"/>
+                        </a:solidFill>
+                        <a:prstDash val="solid"/>
+                        <a:miter lim="0"/>
+                      </a:ln>
+                      <a:noFill/>
+                      <a:effectLst>
+                        <a:outerShdw blurRad="25502" dist="23000" dir="7020000" algn="tl">
+                          <a:srgbClr val="000000">
+                            <a:alpha val="50000"/>
+                          </a:srgbClr>
+                        </a:outerShdw>
+                      </a:effectLst>
+                      <a:latin typeface="Calibri"/>
+                      <a:ea typeface="Calibri"/>
+                      <a:cs typeface="Times New Roman"/>
+                    </a:rPr>
+                    <a:t>3</a:t>
+                  </a:r>
+                  <a:endParaRPr lang="en-NZ" sz="1100">
+                    <a:effectLst/>
+                    <a:latin typeface="Calibri"/>
+                    <a:ea typeface="Calibri"/>
+                    <a:cs typeface="Times New Roman"/>
+                  </a:endParaRPr>
+                </a:p>
+              </p:txBody>
+            </p:sp>
+            <p:sp>
+              <p:nvSpPr>
+                <p:cNvPr id="23" name="Text Box 2"/>
+                <p:cNvSpPr txBox="1">
+                  <a:spLocks noChangeArrowheads="1"/>
+                </p:cNvSpPr>
+                <p:nvPr/>
+              </p:nvSpPr>
+              <p:spPr bwMode="auto">
+                <a:xfrm>
+                  <a:off x="1300162" y="476250"/>
+                  <a:ext cx="276225" cy="438150"/>
+                </a:xfrm>
+                <a:prstGeom prst="rect">
+                  <a:avLst/>
+                </a:prstGeom>
+                <a:noFill/>
+                <a:ln w="9525">
+                  <a:noFill/>
+                  <a:miter lim="800000"/>
+                  <a:headEnd/>
+                  <a:tailEnd/>
+                </a:ln>
+              </p:spPr>
+              <p:txBody>
+                <a:bodyPr rot="0" vert="horz" wrap="square" lIns="91440" tIns="45720" rIns="91440" bIns="45720" anchor="t" anchorCtr="0">
+                  <a:spAutoFit/>
+                </a:bodyPr>
+                <a:lstStyle/>
+                <a:p>
+                  <a:pPr>
+                    <a:lnSpc>
+                      <a:spcPct val="115000"/>
+                    </a:lnSpc>
+                    <a:spcAft>
+                      <a:spcPts val="1000"/>
+                    </a:spcAft>
+                  </a:pPr>
+                  <a:r>
+                    <a:rPr lang="en-NZ" sz="1100" b="1">
+                      <a:ln w="9004" cap="flat" cmpd="sng" algn="ctr">
+                        <a:solidFill>
+                          <a:srgbClr val="D73A36"/>
+                        </a:solidFill>
+                        <a:prstDash val="solid"/>
+                        <a:miter lim="0"/>
+                      </a:ln>
+                      <a:noFill/>
+                      <a:effectLst>
+                        <a:outerShdw blurRad="25502" dist="23000" dir="7020000" algn="tl">
+                          <a:srgbClr val="000000">
+                            <a:alpha val="50000"/>
+                          </a:srgbClr>
+                        </a:outerShdw>
+                      </a:effectLst>
+                      <a:latin typeface="Calibri"/>
+                      <a:ea typeface="Calibri"/>
+                      <a:cs typeface="Times New Roman"/>
+                    </a:rPr>
+                    <a:t>4</a:t>
+                  </a:r>
+                  <a:endParaRPr lang="en-NZ" sz="1100">
+                    <a:effectLst/>
+                    <a:latin typeface="Calibri"/>
+                    <a:ea typeface="Calibri"/>
+                    <a:cs typeface="Times New Roman"/>
+                  </a:endParaRPr>
+                </a:p>
+              </p:txBody>
+            </p:sp>
+            <p:sp>
+              <p:nvSpPr>
+                <p:cNvPr id="24" name="Text Box 2"/>
+                <p:cNvSpPr txBox="1">
+                  <a:spLocks noChangeArrowheads="1"/>
+                </p:cNvSpPr>
+                <p:nvPr/>
+              </p:nvSpPr>
+              <p:spPr bwMode="auto">
+                <a:xfrm>
+                  <a:off x="1514475" y="319087"/>
+                  <a:ext cx="276225" cy="438150"/>
+                </a:xfrm>
+                <a:prstGeom prst="rect">
+                  <a:avLst/>
+                </a:prstGeom>
+                <a:noFill/>
+                <a:ln w="9525">
+                  <a:noFill/>
+                  <a:miter lim="800000"/>
+                  <a:headEnd/>
+                  <a:tailEnd/>
+                </a:ln>
+              </p:spPr>
+              <p:txBody>
+                <a:bodyPr rot="0" vert="horz" wrap="square" lIns="91440" tIns="45720" rIns="91440" bIns="45720" anchor="t" anchorCtr="0">
+                  <a:spAutoFit/>
+                </a:bodyPr>
+                <a:lstStyle/>
+                <a:p>
+                  <a:pPr>
+                    <a:lnSpc>
+                      <a:spcPct val="115000"/>
+                    </a:lnSpc>
+                    <a:spcAft>
+                      <a:spcPts val="1000"/>
+                    </a:spcAft>
+                  </a:pPr>
+                  <a:r>
+                    <a:rPr lang="en-NZ" sz="1100" b="1">
+                      <a:ln w="9004" cap="flat" cmpd="sng" algn="ctr">
+                        <a:solidFill>
+                          <a:srgbClr val="D73A36"/>
+                        </a:solidFill>
+                        <a:prstDash val="solid"/>
+                        <a:miter lim="0"/>
+                      </a:ln>
+                      <a:noFill/>
+                      <a:effectLst>
+                        <a:outerShdw blurRad="25502" dist="23000" dir="7020000" algn="tl">
+                          <a:srgbClr val="000000">
+                            <a:alpha val="50000"/>
+                          </a:srgbClr>
+                        </a:outerShdw>
+                      </a:effectLst>
+                      <a:latin typeface="Calibri"/>
+                      <a:ea typeface="Calibri"/>
+                      <a:cs typeface="Times New Roman"/>
+                    </a:rPr>
+                    <a:t>5</a:t>
+                  </a:r>
+                  <a:endParaRPr lang="en-NZ" sz="1100">
+                    <a:effectLst/>
+                    <a:latin typeface="Calibri"/>
+                    <a:ea typeface="Calibri"/>
+                    <a:cs typeface="Times New Roman"/>
+                  </a:endParaRPr>
+                </a:p>
+              </p:txBody>
+            </p:sp>
+            <p:sp>
+              <p:nvSpPr>
+                <p:cNvPr id="25" name="Text Box 2"/>
+                <p:cNvSpPr txBox="1">
+                  <a:spLocks noChangeArrowheads="1"/>
+                </p:cNvSpPr>
+                <p:nvPr/>
+              </p:nvSpPr>
+              <p:spPr bwMode="auto">
+                <a:xfrm>
+                  <a:off x="1790700" y="147637"/>
+                  <a:ext cx="276225" cy="438150"/>
+                </a:xfrm>
+                <a:prstGeom prst="rect">
+                  <a:avLst/>
+                </a:prstGeom>
+                <a:noFill/>
+                <a:ln w="9525">
+                  <a:noFill/>
+                  <a:miter lim="800000"/>
+                  <a:headEnd/>
+                  <a:tailEnd/>
+                </a:ln>
+              </p:spPr>
+              <p:txBody>
+                <a:bodyPr rot="0" vert="horz" wrap="square" lIns="91440" tIns="45720" rIns="91440" bIns="45720" anchor="t" anchorCtr="0">
+                  <a:spAutoFit/>
+                </a:bodyPr>
+                <a:lstStyle/>
+                <a:p>
+                  <a:pPr>
+                    <a:lnSpc>
+                      <a:spcPct val="115000"/>
+                    </a:lnSpc>
+                    <a:spcAft>
+                      <a:spcPts val="1000"/>
+                    </a:spcAft>
+                  </a:pPr>
+                  <a:r>
+                    <a:rPr lang="en-NZ" sz="1100" b="1">
+                      <a:ln w="9004" cap="flat" cmpd="sng" algn="ctr">
+                        <a:solidFill>
+                          <a:srgbClr val="D73A36"/>
+                        </a:solidFill>
+                        <a:prstDash val="solid"/>
+                        <a:miter lim="0"/>
+                      </a:ln>
+                      <a:noFill/>
+                      <a:effectLst>
+                        <a:outerShdw blurRad="25502" dist="23000" dir="7020000" algn="tl">
+                          <a:srgbClr val="000000">
+                            <a:alpha val="50000"/>
+                          </a:srgbClr>
+                        </a:outerShdw>
+                      </a:effectLst>
+                      <a:latin typeface="Calibri"/>
+                      <a:ea typeface="Calibri"/>
+                      <a:cs typeface="Times New Roman"/>
+                    </a:rPr>
+                    <a:t>6</a:t>
+                  </a:r>
+                  <a:endParaRPr lang="en-NZ" sz="1100">
+                    <a:effectLst/>
+                    <a:latin typeface="Calibri"/>
+                    <a:ea typeface="Calibri"/>
+                    <a:cs typeface="Times New Roman"/>
+                  </a:endParaRPr>
+                </a:p>
+              </p:txBody>
+            </p:sp>
+            <p:sp>
+              <p:nvSpPr>
+                <p:cNvPr id="26" name="Text Box 2"/>
+                <p:cNvSpPr txBox="1">
+                  <a:spLocks noChangeArrowheads="1"/>
+                </p:cNvSpPr>
+                <p:nvPr/>
+              </p:nvSpPr>
+              <p:spPr bwMode="auto">
+                <a:xfrm>
+                  <a:off x="2066925" y="0"/>
+                  <a:ext cx="276225" cy="438150"/>
+                </a:xfrm>
+                <a:prstGeom prst="rect">
+                  <a:avLst/>
+                </a:prstGeom>
+                <a:noFill/>
+                <a:ln w="9525">
+                  <a:noFill/>
+                  <a:miter lim="800000"/>
+                  <a:headEnd/>
+                  <a:tailEnd/>
+                </a:ln>
+              </p:spPr>
+              <p:txBody>
+                <a:bodyPr rot="0" vert="horz" wrap="square" lIns="91440" tIns="45720" rIns="91440" bIns="45720" anchor="t" anchorCtr="0">
+                  <a:spAutoFit/>
+                </a:bodyPr>
+                <a:lstStyle/>
+                <a:p>
+                  <a:pPr>
+                    <a:lnSpc>
+                      <a:spcPct val="115000"/>
+                    </a:lnSpc>
+                    <a:spcAft>
+                      <a:spcPts val="1000"/>
+                    </a:spcAft>
+                  </a:pPr>
+                  <a:r>
+                    <a:rPr lang="en-NZ" sz="1100" b="1">
+                      <a:ln w="9004" cap="flat" cmpd="sng" algn="ctr">
+                        <a:solidFill>
+                          <a:srgbClr val="D73A36"/>
+                        </a:solidFill>
+                        <a:prstDash val="solid"/>
+                        <a:miter lim="0"/>
+                      </a:ln>
+                      <a:noFill/>
+                      <a:effectLst>
+                        <a:outerShdw blurRad="25502" dist="23000" dir="7020000" algn="tl">
+                          <a:srgbClr val="000000">
+                            <a:alpha val="50000"/>
+                          </a:srgbClr>
+                        </a:outerShdw>
+                      </a:effectLst>
+                      <a:latin typeface="Calibri"/>
+                      <a:ea typeface="Calibri"/>
+                      <a:cs typeface="Times New Roman"/>
+                    </a:rPr>
+                    <a:t>7</a:t>
+                  </a:r>
+                  <a:endParaRPr lang="en-NZ" sz="1100">
+                    <a:effectLst/>
+                    <a:latin typeface="Calibri"/>
+                    <a:ea typeface="Calibri"/>
+                    <a:cs typeface="Times New Roman"/>
+                  </a:endParaRPr>
+                </a:p>
+              </p:txBody>
+            </p:sp>
+          </p:grpSp>
+          <p:grpSp>
+            <p:nvGrpSpPr>
+              <p:cNvPr id="8" name="Group 7"/>
+              <p:cNvGrpSpPr/>
+              <p:nvPr/>
+            </p:nvGrpSpPr>
+            <p:grpSpPr>
+              <a:xfrm>
+                <a:off x="2276475" y="0"/>
+                <a:ext cx="1714500" cy="1314450"/>
+                <a:chOff x="0" y="0"/>
+                <a:chExt cx="1714500" cy="1314450"/>
+              </a:xfrm>
+            </p:grpSpPr>
+            <p:grpSp>
+              <p:nvGrpSpPr>
+                <p:cNvPr id="9" name="Group 8"/>
+                <p:cNvGrpSpPr/>
+                <p:nvPr/>
+              </p:nvGrpSpPr>
+              <p:grpSpPr>
+                <a:xfrm>
+                  <a:off x="0" y="547688"/>
+                  <a:ext cx="1000125" cy="766762"/>
+                  <a:chOff x="0" y="0"/>
+                  <a:chExt cx="1000125" cy="766762"/>
+                </a:xfrm>
+              </p:grpSpPr>
+              <p:sp>
+                <p:nvSpPr>
+                  <p:cNvPr id="16" name="Text Box 2"/>
+                  <p:cNvSpPr txBox="1">
+                    <a:spLocks noChangeArrowheads="1"/>
+                  </p:cNvSpPr>
+                  <p:nvPr/>
+                </p:nvSpPr>
+                <p:spPr bwMode="auto">
+                  <a:xfrm>
+                    <a:off x="0" y="328612"/>
+                    <a:ext cx="276225" cy="438150"/>
+                  </a:xfrm>
+                  <a:prstGeom prst="rect">
+                    <a:avLst/>
+                  </a:prstGeom>
+                  <a:noFill/>
+                  <a:ln w="9525">
+                    <a:noFill/>
+                    <a:miter lim="800000"/>
+                    <a:headEnd/>
+                    <a:tailEnd/>
+                  </a:ln>
+                </p:spPr>
+                <p:txBody>
+                  <a:bodyPr rot="0" vert="horz" wrap="square" lIns="91440" tIns="45720" rIns="91440" bIns="45720" anchor="t" anchorCtr="0">
+                    <a:spAutoFit/>
+                  </a:bodyPr>
+                  <a:lstStyle/>
+                  <a:p>
+                    <a:pPr>
+                      <a:lnSpc>
+                        <a:spcPct val="115000"/>
+                      </a:lnSpc>
+                      <a:spcAft>
+                        <a:spcPts val="1000"/>
+                      </a:spcAft>
+                    </a:pPr>
+                    <a:r>
+                      <a:rPr lang="en-NZ" sz="1100" b="1">
+                        <a:ln w="9004" cap="flat" cmpd="sng" algn="ctr">
+                          <a:solidFill>
+                            <a:srgbClr val="D73A36"/>
+                          </a:solidFill>
+                          <a:prstDash val="solid"/>
+                          <a:miter lim="0"/>
+                        </a:ln>
+                        <a:noFill/>
+                        <a:effectLst>
+                          <a:outerShdw blurRad="25502" dist="23000" dir="7020000" algn="tl">
+                            <a:srgbClr val="000000">
+                              <a:alpha val="50000"/>
+                            </a:srgbClr>
+                          </a:outerShdw>
+                        </a:effectLst>
+                        <a:latin typeface="Calibri"/>
+                        <a:ea typeface="Calibri"/>
+                        <a:cs typeface="Times New Roman"/>
+                      </a:rPr>
+                      <a:t>8</a:t>
+                    </a:r>
+                    <a:endParaRPr lang="en-NZ" sz="1100">
+                      <a:effectLst/>
+                      <a:latin typeface="Calibri"/>
+                      <a:ea typeface="Calibri"/>
+                      <a:cs typeface="Times New Roman"/>
+                    </a:endParaRPr>
+                  </a:p>
+                </p:txBody>
+              </p:sp>
+              <p:sp>
+                <p:nvSpPr>
+                  <p:cNvPr id="17" name="Text Box 2"/>
+                  <p:cNvSpPr txBox="1">
+                    <a:spLocks noChangeArrowheads="1"/>
+                  </p:cNvSpPr>
+                  <p:nvPr/>
+                </p:nvSpPr>
+                <p:spPr bwMode="auto">
+                  <a:xfrm>
+                    <a:off x="242887" y="228600"/>
+                    <a:ext cx="276225" cy="438150"/>
+                  </a:xfrm>
+                  <a:prstGeom prst="rect">
+                    <a:avLst/>
+                  </a:prstGeom>
+                  <a:noFill/>
+                  <a:ln w="9525">
+                    <a:noFill/>
+                    <a:miter lim="800000"/>
+                    <a:headEnd/>
+                    <a:tailEnd/>
+                  </a:ln>
+                </p:spPr>
+                <p:txBody>
+                  <a:bodyPr rot="0" vert="horz" wrap="square" lIns="91440" tIns="45720" rIns="91440" bIns="45720" anchor="t" anchorCtr="0">
+                    <a:spAutoFit/>
+                  </a:bodyPr>
+                  <a:lstStyle/>
+                  <a:p>
+                    <a:pPr>
+                      <a:lnSpc>
+                        <a:spcPct val="115000"/>
+                      </a:lnSpc>
+                      <a:spcAft>
+                        <a:spcPts val="1000"/>
+                      </a:spcAft>
+                    </a:pPr>
+                    <a:r>
+                      <a:rPr lang="en-NZ" sz="1100" b="1">
+                        <a:ln w="9004" cap="flat" cmpd="sng" algn="ctr">
+                          <a:solidFill>
+                            <a:srgbClr val="D73A36"/>
+                          </a:solidFill>
+                          <a:prstDash val="solid"/>
+                          <a:miter lim="0"/>
+                        </a:ln>
+                        <a:noFill/>
+                        <a:effectLst>
+                          <a:outerShdw blurRad="25502" dist="23000" dir="7020000" algn="tl">
+                            <a:srgbClr val="000000">
+                              <a:alpha val="50000"/>
+                            </a:srgbClr>
+                          </a:outerShdw>
+                        </a:effectLst>
+                        <a:latin typeface="Calibri"/>
+                        <a:ea typeface="Calibri"/>
+                        <a:cs typeface="Times New Roman"/>
+                      </a:rPr>
+                      <a:t>9</a:t>
+                    </a:r>
+                    <a:endParaRPr lang="en-NZ" sz="1100">
+                      <a:effectLst/>
+                      <a:latin typeface="Calibri"/>
+                      <a:ea typeface="Calibri"/>
+                      <a:cs typeface="Times New Roman"/>
+                    </a:endParaRPr>
+                  </a:p>
+                </p:txBody>
+              </p:sp>
+              <p:sp>
+                <p:nvSpPr>
+                  <p:cNvPr id="18" name="Text Box 2"/>
+                  <p:cNvSpPr txBox="1">
+                    <a:spLocks noChangeArrowheads="1"/>
+                  </p:cNvSpPr>
+                  <p:nvPr/>
+                </p:nvSpPr>
+                <p:spPr bwMode="auto">
+                  <a:xfrm>
+                    <a:off x="419100" y="109537"/>
+                    <a:ext cx="381000" cy="438150"/>
+                  </a:xfrm>
+                  <a:prstGeom prst="rect">
+                    <a:avLst/>
+                  </a:prstGeom>
+                  <a:noFill/>
+                  <a:ln w="9525">
+                    <a:noFill/>
+                    <a:miter lim="800000"/>
+                    <a:headEnd/>
+                    <a:tailEnd/>
+                  </a:ln>
+                </p:spPr>
+                <p:txBody>
+                  <a:bodyPr rot="0" vert="horz" wrap="square" lIns="91440" tIns="45720" rIns="91440" bIns="45720" anchor="t" anchorCtr="0">
+                    <a:spAutoFit/>
+                  </a:bodyPr>
+                  <a:lstStyle/>
+                  <a:p>
+                    <a:pPr>
+                      <a:lnSpc>
+                        <a:spcPct val="115000"/>
+                      </a:lnSpc>
+                      <a:spcAft>
+                        <a:spcPts val="1000"/>
+                      </a:spcAft>
+                    </a:pPr>
+                    <a:r>
+                      <a:rPr lang="en-NZ" sz="1100" b="1">
+                        <a:ln w="9004" cap="flat" cmpd="sng" algn="ctr">
+                          <a:solidFill>
+                            <a:srgbClr val="D73A36"/>
+                          </a:solidFill>
+                          <a:prstDash val="solid"/>
+                          <a:miter lim="0"/>
+                        </a:ln>
+                        <a:noFill/>
+                        <a:effectLst>
+                          <a:outerShdw blurRad="25502" dist="23000" dir="7020000" algn="tl">
+                            <a:srgbClr val="000000">
+                              <a:alpha val="50000"/>
+                            </a:srgbClr>
+                          </a:outerShdw>
+                        </a:effectLst>
+                        <a:latin typeface="Calibri"/>
+                        <a:ea typeface="Calibri"/>
+                        <a:cs typeface="Times New Roman"/>
+                      </a:rPr>
+                      <a:t>10</a:t>
+                    </a:r>
+                    <a:endParaRPr lang="en-NZ" sz="1100">
+                      <a:effectLst/>
+                      <a:latin typeface="Calibri"/>
+                      <a:ea typeface="Calibri"/>
+                      <a:cs typeface="Times New Roman"/>
+                    </a:endParaRPr>
+                  </a:p>
+                </p:txBody>
+              </p:sp>
+              <p:sp>
+                <p:nvSpPr>
+                  <p:cNvPr id="19" name="Text Box 2"/>
+                  <p:cNvSpPr txBox="1">
+                    <a:spLocks noChangeArrowheads="1"/>
+                  </p:cNvSpPr>
+                  <p:nvPr/>
+                </p:nvSpPr>
+                <p:spPr bwMode="auto">
+                  <a:xfrm>
+                    <a:off x="619125" y="0"/>
+                    <a:ext cx="381000" cy="438150"/>
+                  </a:xfrm>
+                  <a:prstGeom prst="rect">
+                    <a:avLst/>
+                  </a:prstGeom>
+                  <a:noFill/>
+                  <a:ln w="9525">
+                    <a:noFill/>
+                    <a:miter lim="800000"/>
+                    <a:headEnd/>
+                    <a:tailEnd/>
+                  </a:ln>
+                </p:spPr>
+                <p:txBody>
+                  <a:bodyPr rot="0" vert="horz" wrap="square" lIns="91440" tIns="45720" rIns="91440" bIns="45720" anchor="t" anchorCtr="0">
+                    <a:spAutoFit/>
+                  </a:bodyPr>
+                  <a:lstStyle/>
+                  <a:p>
+                    <a:pPr>
+                      <a:lnSpc>
+                        <a:spcPct val="115000"/>
+                      </a:lnSpc>
+                      <a:spcAft>
+                        <a:spcPts val="1000"/>
+                      </a:spcAft>
+                    </a:pPr>
+                    <a:r>
+                      <a:rPr lang="en-NZ" sz="1100" b="1">
+                        <a:ln w="9004" cap="flat" cmpd="sng" algn="ctr">
+                          <a:solidFill>
+                            <a:srgbClr val="D73A36"/>
+                          </a:solidFill>
+                          <a:prstDash val="solid"/>
+                          <a:miter lim="0"/>
+                        </a:ln>
+                        <a:noFill/>
+                        <a:effectLst>
+                          <a:outerShdw blurRad="25502" dist="23000" dir="7020000" algn="tl">
+                            <a:srgbClr val="000000">
+                              <a:alpha val="50000"/>
+                            </a:srgbClr>
+                          </a:outerShdw>
+                        </a:effectLst>
+                        <a:latin typeface="Calibri"/>
+                        <a:ea typeface="Calibri"/>
+                        <a:cs typeface="Times New Roman"/>
+                      </a:rPr>
+                      <a:t>11</a:t>
+                    </a:r>
+                    <a:endParaRPr lang="en-NZ" sz="1100">
+                      <a:effectLst/>
+                      <a:latin typeface="Calibri"/>
+                      <a:ea typeface="Calibri"/>
+                      <a:cs typeface="Times New Roman"/>
+                    </a:endParaRPr>
+                  </a:p>
+                </p:txBody>
+              </p:sp>
+            </p:grpSp>
+            <p:grpSp>
+              <p:nvGrpSpPr>
+                <p:cNvPr id="10" name="Group 9"/>
+                <p:cNvGrpSpPr/>
+                <p:nvPr/>
+              </p:nvGrpSpPr>
+              <p:grpSpPr>
+                <a:xfrm>
+                  <a:off x="800100" y="0"/>
+                  <a:ext cx="914400" cy="866775"/>
+                  <a:chOff x="0" y="0"/>
+                  <a:chExt cx="914400" cy="866775"/>
+                </a:xfrm>
+              </p:grpSpPr>
+              <p:sp>
+                <p:nvSpPr>
+                  <p:cNvPr id="11" name="Text Box 2"/>
+                  <p:cNvSpPr txBox="1">
+                    <a:spLocks noChangeArrowheads="1"/>
+                  </p:cNvSpPr>
+                  <p:nvPr/>
+                </p:nvSpPr>
+                <p:spPr bwMode="auto">
+                  <a:xfrm>
+                    <a:off x="0" y="428625"/>
+                    <a:ext cx="381000" cy="438150"/>
+                  </a:xfrm>
+                  <a:prstGeom prst="rect">
+                    <a:avLst/>
+                  </a:prstGeom>
+                  <a:noFill/>
+                  <a:ln w="9525">
+                    <a:noFill/>
+                    <a:miter lim="800000"/>
+                    <a:headEnd/>
+                    <a:tailEnd/>
+                  </a:ln>
+                </p:spPr>
+                <p:txBody>
+                  <a:bodyPr rot="0" vert="horz" wrap="square" lIns="91440" tIns="45720" rIns="91440" bIns="45720" anchor="t" anchorCtr="0">
+                    <a:spAutoFit/>
+                  </a:bodyPr>
+                  <a:lstStyle/>
+                  <a:p>
+                    <a:pPr>
+                      <a:lnSpc>
+                        <a:spcPct val="115000"/>
+                      </a:lnSpc>
+                      <a:spcAft>
+                        <a:spcPts val="1000"/>
+                      </a:spcAft>
+                    </a:pPr>
+                    <a:r>
+                      <a:rPr lang="en-NZ" sz="1100" b="1">
+                        <a:ln w="9004" cap="flat" cmpd="sng" algn="ctr">
+                          <a:solidFill>
+                            <a:srgbClr val="D73A36"/>
+                          </a:solidFill>
+                          <a:prstDash val="solid"/>
+                          <a:miter lim="0"/>
+                        </a:ln>
+                        <a:noFill/>
+                        <a:effectLst>
+                          <a:outerShdw blurRad="25502" dist="23000" dir="7020000" algn="tl">
+                            <a:srgbClr val="000000">
+                              <a:alpha val="50000"/>
+                            </a:srgbClr>
+                          </a:outerShdw>
+                        </a:effectLst>
+                        <a:latin typeface="Calibri"/>
+                        <a:ea typeface="Calibri"/>
+                        <a:cs typeface="Times New Roman"/>
+                      </a:rPr>
+                      <a:t>12</a:t>
+                    </a:r>
+                    <a:endParaRPr lang="en-NZ" sz="1100">
+                      <a:effectLst/>
+                      <a:latin typeface="Calibri"/>
+                      <a:ea typeface="Calibri"/>
+                      <a:cs typeface="Times New Roman"/>
+                    </a:endParaRPr>
+                  </a:p>
+                </p:txBody>
+              </p:sp>
+              <p:sp>
+                <p:nvSpPr>
+                  <p:cNvPr id="12" name="Text Box 2"/>
+                  <p:cNvSpPr txBox="1">
+                    <a:spLocks noChangeArrowheads="1"/>
+                  </p:cNvSpPr>
+                  <p:nvPr/>
+                </p:nvSpPr>
+                <p:spPr bwMode="auto">
+                  <a:xfrm>
+                    <a:off x="109537" y="300038"/>
+                    <a:ext cx="381000" cy="438150"/>
+                  </a:xfrm>
+                  <a:prstGeom prst="rect">
+                    <a:avLst/>
+                  </a:prstGeom>
+                  <a:noFill/>
+                  <a:ln w="9525">
+                    <a:noFill/>
+                    <a:miter lim="800000"/>
+                    <a:headEnd/>
+                    <a:tailEnd/>
+                  </a:ln>
+                </p:spPr>
+                <p:txBody>
+                  <a:bodyPr rot="0" vert="horz" wrap="square" lIns="91440" tIns="45720" rIns="91440" bIns="45720" anchor="t" anchorCtr="0">
+                    <a:spAutoFit/>
+                  </a:bodyPr>
+                  <a:lstStyle/>
+                  <a:p>
+                    <a:pPr>
+                      <a:lnSpc>
+                        <a:spcPct val="115000"/>
+                      </a:lnSpc>
+                      <a:spcAft>
+                        <a:spcPts val="1000"/>
+                      </a:spcAft>
+                    </a:pPr>
+                    <a:r>
+                      <a:rPr lang="en-NZ" sz="1100" b="1">
+                        <a:ln w="9004" cap="flat" cmpd="sng" algn="ctr">
+                          <a:solidFill>
+                            <a:srgbClr val="D73A36"/>
+                          </a:solidFill>
+                          <a:prstDash val="solid"/>
+                          <a:miter lim="0"/>
+                        </a:ln>
+                        <a:noFill/>
+                        <a:effectLst>
+                          <a:outerShdw blurRad="25502" dist="23000" dir="7020000" algn="tl">
+                            <a:srgbClr val="000000">
+                              <a:alpha val="50000"/>
+                            </a:srgbClr>
+                          </a:outerShdw>
+                        </a:effectLst>
+                        <a:latin typeface="Calibri"/>
+                        <a:ea typeface="Calibri"/>
+                        <a:cs typeface="Times New Roman"/>
+                      </a:rPr>
+                      <a:t>13</a:t>
+                    </a:r>
+                    <a:endParaRPr lang="en-NZ" sz="1100">
+                      <a:effectLst/>
+                      <a:latin typeface="Calibri"/>
+                      <a:ea typeface="Calibri"/>
+                      <a:cs typeface="Times New Roman"/>
+                    </a:endParaRPr>
+                  </a:p>
+                </p:txBody>
+              </p:sp>
+              <p:sp>
+                <p:nvSpPr>
+                  <p:cNvPr id="13" name="Text Box 2"/>
+                  <p:cNvSpPr txBox="1">
+                    <a:spLocks noChangeArrowheads="1"/>
+                  </p:cNvSpPr>
+                  <p:nvPr/>
+                </p:nvSpPr>
+                <p:spPr bwMode="auto">
+                  <a:xfrm>
+                    <a:off x="276225" y="228600"/>
+                    <a:ext cx="381000" cy="438150"/>
+                  </a:xfrm>
+                  <a:prstGeom prst="rect">
+                    <a:avLst/>
+                  </a:prstGeom>
+                  <a:noFill/>
+                  <a:ln w="9525">
+                    <a:noFill/>
+                    <a:miter lim="800000"/>
+                    <a:headEnd/>
+                    <a:tailEnd/>
+                  </a:ln>
+                </p:spPr>
+                <p:txBody>
+                  <a:bodyPr rot="0" vert="horz" wrap="square" lIns="91440" tIns="45720" rIns="91440" bIns="45720" anchor="t" anchorCtr="0">
+                    <a:spAutoFit/>
+                  </a:bodyPr>
+                  <a:lstStyle/>
+                  <a:p>
+                    <a:pPr>
+                      <a:lnSpc>
+                        <a:spcPct val="115000"/>
+                      </a:lnSpc>
+                      <a:spcAft>
+                        <a:spcPts val="1000"/>
+                      </a:spcAft>
+                    </a:pPr>
+                    <a:r>
+                      <a:rPr lang="en-NZ" sz="1100" b="1">
+                        <a:ln w="9004" cap="flat" cmpd="sng" algn="ctr">
+                          <a:solidFill>
+                            <a:srgbClr val="D73A36"/>
+                          </a:solidFill>
+                          <a:prstDash val="solid"/>
+                          <a:miter lim="0"/>
+                        </a:ln>
+                        <a:noFill/>
+                        <a:effectLst>
+                          <a:outerShdw blurRad="25502" dist="23000" dir="7020000" algn="tl">
+                            <a:srgbClr val="000000">
+                              <a:alpha val="50000"/>
+                            </a:srgbClr>
+                          </a:outerShdw>
+                        </a:effectLst>
+                        <a:latin typeface="Calibri"/>
+                        <a:ea typeface="Calibri"/>
+                        <a:cs typeface="Times New Roman"/>
+                      </a:rPr>
+                      <a:t>14</a:t>
+                    </a:r>
+                    <a:endParaRPr lang="en-NZ" sz="1100">
+                      <a:effectLst/>
+                      <a:latin typeface="Calibri"/>
+                      <a:ea typeface="Calibri"/>
+                      <a:cs typeface="Times New Roman"/>
+                    </a:endParaRPr>
+                  </a:p>
+                </p:txBody>
+              </p:sp>
+              <p:sp>
+                <p:nvSpPr>
+                  <p:cNvPr id="14" name="Text Box 2"/>
+                  <p:cNvSpPr txBox="1">
+                    <a:spLocks noChangeArrowheads="1"/>
+                  </p:cNvSpPr>
+                  <p:nvPr/>
+                </p:nvSpPr>
+                <p:spPr bwMode="auto">
+                  <a:xfrm>
+                    <a:off x="381000" y="104775"/>
+                    <a:ext cx="381000" cy="438150"/>
+                  </a:xfrm>
+                  <a:prstGeom prst="rect">
+                    <a:avLst/>
+                  </a:prstGeom>
+                  <a:noFill/>
+                  <a:ln w="9525">
+                    <a:noFill/>
+                    <a:miter lim="800000"/>
+                    <a:headEnd/>
+                    <a:tailEnd/>
+                  </a:ln>
+                </p:spPr>
+                <p:txBody>
+                  <a:bodyPr rot="0" vert="horz" wrap="square" lIns="91440" tIns="45720" rIns="91440" bIns="45720" anchor="t" anchorCtr="0">
+                    <a:spAutoFit/>
+                  </a:bodyPr>
+                  <a:lstStyle/>
+                  <a:p>
+                    <a:pPr>
+                      <a:lnSpc>
+                        <a:spcPct val="115000"/>
+                      </a:lnSpc>
+                      <a:spcAft>
+                        <a:spcPts val="1000"/>
+                      </a:spcAft>
+                    </a:pPr>
+                    <a:r>
+                      <a:rPr lang="en-NZ" sz="1100" b="1">
+                        <a:ln w="9004" cap="flat" cmpd="sng" algn="ctr">
+                          <a:solidFill>
+                            <a:srgbClr val="D73A36"/>
+                          </a:solidFill>
+                          <a:prstDash val="solid"/>
+                          <a:miter lim="0"/>
+                        </a:ln>
+                        <a:noFill/>
+                        <a:effectLst>
+                          <a:outerShdw blurRad="25502" dist="23000" dir="7020000" algn="tl">
+                            <a:srgbClr val="000000">
+                              <a:alpha val="50000"/>
+                            </a:srgbClr>
+                          </a:outerShdw>
+                        </a:effectLst>
+                        <a:latin typeface="Calibri"/>
+                        <a:ea typeface="Calibri"/>
+                        <a:cs typeface="Times New Roman"/>
+                      </a:rPr>
+                      <a:t>15</a:t>
+                    </a:r>
+                    <a:endParaRPr lang="en-NZ" sz="1100">
+                      <a:effectLst/>
+                      <a:latin typeface="Calibri"/>
+                      <a:ea typeface="Calibri"/>
+                      <a:cs typeface="Times New Roman"/>
+                    </a:endParaRPr>
+                  </a:p>
+                </p:txBody>
+              </p:sp>
+              <p:sp>
+                <p:nvSpPr>
+                  <p:cNvPr id="15" name="Text Box 2"/>
+                  <p:cNvSpPr txBox="1">
+                    <a:spLocks noChangeArrowheads="1"/>
+                  </p:cNvSpPr>
+                  <p:nvPr/>
+                </p:nvSpPr>
+                <p:spPr bwMode="auto">
+                  <a:xfrm>
+                    <a:off x="533400" y="0"/>
+                    <a:ext cx="381000" cy="438150"/>
+                  </a:xfrm>
+                  <a:prstGeom prst="rect">
+                    <a:avLst/>
+                  </a:prstGeom>
+                  <a:noFill/>
+                  <a:ln w="9525">
+                    <a:noFill/>
+                    <a:miter lim="800000"/>
+                    <a:headEnd/>
+                    <a:tailEnd/>
+                  </a:ln>
+                </p:spPr>
+                <p:txBody>
+                  <a:bodyPr rot="0" vert="horz" wrap="square" lIns="91440" tIns="45720" rIns="91440" bIns="45720" anchor="t" anchorCtr="0">
+                    <a:spAutoFit/>
+                  </a:bodyPr>
+                  <a:lstStyle/>
+                  <a:p>
+                    <a:pPr>
+                      <a:lnSpc>
+                        <a:spcPct val="115000"/>
+                      </a:lnSpc>
+                      <a:spcAft>
+                        <a:spcPts val="1000"/>
+                      </a:spcAft>
+                    </a:pPr>
+                    <a:r>
+                      <a:rPr lang="en-NZ" sz="1100" b="1">
+                        <a:ln w="9004" cap="flat" cmpd="sng" algn="ctr">
+                          <a:solidFill>
+                            <a:srgbClr val="D73A36"/>
+                          </a:solidFill>
+                          <a:prstDash val="solid"/>
+                          <a:miter lim="0"/>
+                        </a:ln>
+                        <a:noFill/>
+                        <a:effectLst>
+                          <a:outerShdw blurRad="25502" dist="23000" dir="7020000" algn="tl">
+                            <a:srgbClr val="000000">
+                              <a:alpha val="50000"/>
+                            </a:srgbClr>
+                          </a:outerShdw>
+                        </a:effectLst>
+                        <a:latin typeface="Calibri"/>
+                        <a:ea typeface="Calibri"/>
+                        <a:cs typeface="Times New Roman"/>
+                      </a:rPr>
+                      <a:t>16</a:t>
+                    </a:r>
+                    <a:endParaRPr lang="en-NZ" sz="1100">
+                      <a:effectLst/>
+                      <a:latin typeface="Calibri"/>
+                      <a:ea typeface="Calibri"/>
+                      <a:cs typeface="Times New Roman"/>
+                    </a:endParaRPr>
+                  </a:p>
+                </p:txBody>
+              </p:sp>
+            </p:grpSp>
+          </p:grpSp>
+        </p:grpSp>
+      </p:grpSp>
+      <p:sp>
+        <p:nvSpPr>
+          <p:cNvPr id="27" name="Title 1"/>
+          <p:cNvSpPr>
+            <a:spLocks noGrp="1"/>
+          </p:cNvSpPr>
+          <p:nvPr>
+            <p:ph type="title"/>
+          </p:nvPr>
+        </p:nvSpPr>
+        <p:spPr>
+          <a:xfrm>
+            <a:off x="573844" y="476672"/>
+            <a:ext cx="8424936" cy="864096"/>
+          </a:xfrm>
+        </p:spPr>
+        <p:txBody>
+          <a:bodyPr>
+            <a:noAutofit/>
+          </a:bodyPr>
+          <a:lstStyle/>
+          <a:p>
+            <a:pPr algn="ctr"/>
+            <a:r>
+              <a:rPr lang="en-NZ" sz="4400" dirty="0" smtClean="0">
+                <a:solidFill>
+                  <a:schemeClr val="tx1"/>
+                </a:solidFill>
+              </a:rPr>
+              <a:t>Global Wave Number</a:t>
+            </a:r>
+            <a:endParaRPr lang="en-NZ" dirty="0">
+              <a:solidFill>
+                <a:schemeClr val="tx1"/>
+              </a:solidFill>
+            </a:endParaRPr>
+          </a:p>
+        </p:txBody>
+      </p:sp>
+    </p:spTree>
+    <p:extLst>
+      <p:ext uri="{BB962C8B-B14F-4D97-AF65-F5344CB8AC3E}">
+        <p14:creationId xmlns:p14="http://schemas.microsoft.com/office/powerpoint/2010/main" val="296242568"/>
+      </p:ext>
+    </p:extLst>
+  </p:cSld>
+  <p:clrMapOvr>
+    <a:masterClrMapping/>
+  </p:clrMapOvr>
+  <p:timing>
+    <p:tnLst>
+      <p:par>
+        <p:cTn id="1" dur="indefinite" restart="never" nodeType="tmRoot"/>
+      </p:par>
+    </p:tnLst>
+  </p:timing>
+</p:sld>
+</file>
+
+<file path=ppt/slides/slide8.xml><?xml version="1.0" encoding="utf-8"?>
 <p:sld xmlns:a="http://schemas.openxmlformats.org/drawingml/2006/main" xmlns:r="http://schemas.openxmlformats.org/officeDocument/2006/relationships" xmlns:p="http://schemas.openxmlformats.org/presentationml/2006/main">
   <p:cSld>
     <p:spTree>
@@ -7453,6 +8022,200 @@
           </a:extLst>
         </p:spPr>
       </p:pic>
+      <p:cxnSp>
+        <p:nvCxnSpPr>
+          <p:cNvPr id="3" name="Straight Arrow Connector 2"/>
+          <p:cNvCxnSpPr/>
+          <p:nvPr/>
+        </p:nvCxnSpPr>
+        <p:spPr>
+          <a:xfrm>
+            <a:off x="3059832" y="1484784"/>
+            <a:ext cx="864096" cy="720080"/>
+          </a:xfrm>
+          <a:prstGeom prst="straightConnector1">
+            <a:avLst/>
+          </a:prstGeom>
+          <a:ln w="38100">
+            <a:solidFill>
+              <a:schemeClr val="tx1"/>
+            </a:solidFill>
+            <a:tailEnd type="arrow"/>
+          </a:ln>
+        </p:spPr>
+        <p:style>
+          <a:lnRef idx="1">
+            <a:schemeClr val="accent1"/>
+          </a:lnRef>
+          <a:fillRef idx="0">
+            <a:schemeClr val="accent1"/>
+          </a:fillRef>
+          <a:effectRef idx="0">
+            <a:schemeClr val="accent1"/>
+          </a:effectRef>
+          <a:fontRef idx="minor">
+            <a:schemeClr val="tx1"/>
+          </a:fontRef>
+        </p:style>
+      </p:cxnSp>
+      <p:sp>
+        <p:nvSpPr>
+          <p:cNvPr id="4" name="TextBox 3"/>
+          <p:cNvSpPr txBox="1"/>
+          <p:nvPr/>
+        </p:nvSpPr>
+        <p:spPr>
+          <a:xfrm>
+            <a:off x="3851920" y="1412776"/>
+            <a:ext cx="2474524" cy="369332"/>
+          </a:xfrm>
+          <a:prstGeom prst="rect">
+            <a:avLst/>
+          </a:prstGeom>
+          <a:noFill/>
+        </p:spPr>
+        <p:txBody>
+          <a:bodyPr wrap="none" rtlCol="0">
+            <a:spAutoFit/>
+          </a:bodyPr>
+          <a:lstStyle/>
+          <a:p>
+            <a:r>
+              <a:rPr lang="en-NZ" dirty="0" smtClean="0"/>
+              <a:t>Wave number increasing</a:t>
+            </a:r>
+            <a:endParaRPr lang="en-NZ" dirty="0"/>
+          </a:p>
+        </p:txBody>
+      </p:sp>
+      <p:sp>
+        <p:nvSpPr>
+          <p:cNvPr id="6" name="TextBox 5"/>
+          <p:cNvSpPr txBox="1"/>
+          <p:nvPr/>
+        </p:nvSpPr>
+        <p:spPr>
+          <a:xfrm>
+            <a:off x="6123899" y="5219908"/>
+            <a:ext cx="392317" cy="261610"/>
+          </a:xfrm>
+          <a:prstGeom prst="rect">
+            <a:avLst/>
+          </a:prstGeom>
+          <a:solidFill>
+            <a:schemeClr val="bg1"/>
+          </a:solidFill>
+        </p:spPr>
+        <p:txBody>
+          <a:bodyPr wrap="square" rtlCol="0">
+            <a:spAutoFit/>
+          </a:bodyPr>
+          <a:lstStyle/>
+          <a:p>
+            <a:r>
+              <a:rPr lang="en-NZ" sz="1100" dirty="0" smtClean="0"/>
+              <a:t>1</a:t>
+            </a:r>
+            <a:endParaRPr lang="en-NZ" sz="1100" dirty="0"/>
+          </a:p>
+        </p:txBody>
+      </p:sp>
+      <p:sp>
+        <p:nvSpPr>
+          <p:cNvPr id="8" name="TextBox 7"/>
+          <p:cNvSpPr txBox="1"/>
+          <p:nvPr/>
+        </p:nvSpPr>
+        <p:spPr>
+          <a:xfrm>
+            <a:off x="3707904" y="5229384"/>
+            <a:ext cx="392317" cy="261610"/>
+          </a:xfrm>
+          <a:prstGeom prst="rect">
+            <a:avLst/>
+          </a:prstGeom>
+          <a:solidFill>
+            <a:schemeClr val="bg1"/>
+          </a:solidFill>
+        </p:spPr>
+        <p:txBody>
+          <a:bodyPr wrap="square" rtlCol="0">
+            <a:spAutoFit/>
+          </a:bodyPr>
+          <a:lstStyle/>
+          <a:p>
+            <a:r>
+              <a:rPr lang="en-NZ" sz="1100" dirty="0" smtClean="0"/>
+              <a:t>0.4</a:t>
+            </a:r>
+            <a:endParaRPr lang="en-NZ" sz="1100" dirty="0"/>
+          </a:p>
+        </p:txBody>
+      </p:sp>
+      <p:sp>
+        <p:nvSpPr>
+          <p:cNvPr id="9" name="TextBox 8"/>
+          <p:cNvSpPr txBox="1"/>
+          <p:nvPr/>
+        </p:nvSpPr>
+        <p:spPr>
+          <a:xfrm>
+            <a:off x="5220072" y="5219908"/>
+            <a:ext cx="392317" cy="261610"/>
+          </a:xfrm>
+          <a:prstGeom prst="rect">
+            <a:avLst/>
+          </a:prstGeom>
+          <a:solidFill>
+            <a:schemeClr val="bg1"/>
+          </a:solidFill>
+        </p:spPr>
+        <p:txBody>
+          <a:bodyPr wrap="square" rtlCol="0">
+            <a:spAutoFit/>
+          </a:bodyPr>
+          <a:lstStyle/>
+          <a:p>
+            <a:r>
+              <a:rPr lang="en-NZ" sz="1100" dirty="0" smtClean="0"/>
+              <a:t>0.8</a:t>
+            </a:r>
+            <a:endParaRPr lang="en-NZ" sz="1100" dirty="0"/>
+          </a:p>
+        </p:txBody>
+      </p:sp>
+      <p:sp>
+        <p:nvSpPr>
+          <p:cNvPr id="10" name="TextBox 9"/>
+          <p:cNvSpPr txBox="1"/>
+          <p:nvPr/>
+        </p:nvSpPr>
+        <p:spPr>
+          <a:xfrm>
+            <a:off x="2771800" y="5219908"/>
+            <a:ext cx="536333" cy="261610"/>
+          </a:xfrm>
+          <a:prstGeom prst="rect">
+            <a:avLst/>
+          </a:prstGeom>
+          <a:solidFill>
+            <a:schemeClr val="bg1"/>
+          </a:solidFill>
+        </p:spPr>
+        <p:txBody>
+          <a:bodyPr wrap="square" rtlCol="0">
+            <a:spAutoFit/>
+          </a:bodyPr>
+          <a:lstStyle/>
+          <a:p>
+            <a:r>
+              <a:rPr lang="en-NZ" sz="1100" dirty="0" smtClean="0"/>
+              <a:t>0.2</a:t>
+            </a:r>
+            <a:endParaRPr lang="en-NZ" sz="1100" dirty="0"/>
+          </a:p>
+        </p:txBody>
+      </p:sp>
     </p:spTree>
     <p:extLst>
       <p:ext uri="{BB962C8B-B14F-4D97-AF65-F5344CB8AC3E}">
@@ -7466,14 +8229,128 @@
   <p:timing>
     <p:tnLst>
       <p:par>
-        <p:cTn id="1" dur="indefinite" restart="never" nodeType="tmRoot"/>
+        <p:cTn id="1" dur="indefinite" restart="never" nodeType="tmRoot">
+          <p:childTnLst>
+            <p:seq concurrent="1" nextAc="seek">
+              <p:cTn id="2" dur="indefinite" nodeType="mainSeq">
+                <p:childTnLst>
+                  <p:par>
+                    <p:cTn id="3" fill="hold">
+                      <p:stCondLst>
+                        <p:cond delay="indefinite"/>
+                      </p:stCondLst>
+                      <p:childTnLst>
+                        <p:par>
+                          <p:cTn id="4" fill="hold">
+                            <p:stCondLst>
+                              <p:cond delay="0"/>
+                            </p:stCondLst>
+                            <p:childTnLst>
+                              <p:par>
+                                <p:cTn id="5" presetID="10" presetClass="entr" presetSubtype="0" fill="hold" nodeType="clickEffect">
+                                  <p:stCondLst>
+                                    <p:cond delay="0"/>
+                                  </p:stCondLst>
+                                  <p:childTnLst>
+                                    <p:set>
+                                      <p:cBhvr>
+                                        <p:cTn id="6" dur="1" fill="hold">
+                                          <p:stCondLst>
+                                            <p:cond delay="0"/>
+                                          </p:stCondLst>
+                                        </p:cTn>
+                                        <p:tgtEl>
+                                          <p:spTgt spid="3"/>
+                                        </p:tgtEl>
+                                        <p:attrNameLst>
+                                          <p:attrName>style.visibility</p:attrName>
+                                        </p:attrNameLst>
+                                      </p:cBhvr>
+                                      <p:to>
+                                        <p:strVal val="visible"/>
+                                      </p:to>
+                                    </p:set>
+                                    <p:animEffect transition="in" filter="fade">
+                                      <p:cBhvr>
+                                        <p:cTn id="7" dur="500"/>
+                                        <p:tgtEl>
+                                          <p:spTgt spid="3"/>
+                                        </p:tgtEl>
+                                      </p:cBhvr>
+                                    </p:animEffect>
+                                  </p:childTnLst>
+                                </p:cTn>
+                              </p:par>
+                              <p:par>
+                                <p:cTn id="8" presetID="10" presetClass="entr" presetSubtype="0" fill="hold" grpId="0" nodeType="withEffect">
+                                  <p:stCondLst>
+                                    <p:cond delay="0"/>
+                                  </p:stCondLst>
+                                  <p:childTnLst>
+                                    <p:set>
+                                      <p:cBhvr>
+                                        <p:cTn id="9" dur="1" fill="hold">
+                                          <p:stCondLst>
+                                            <p:cond delay="0"/>
+                                          </p:stCondLst>
+                                        </p:cTn>
+                                        <p:tgtEl>
+                                          <p:spTgt spid="4"/>
+                                        </p:tgtEl>
+                                        <p:attrNameLst>
+                                          <p:attrName>style.visibility</p:attrName>
+                                        </p:attrNameLst>
+                                      </p:cBhvr>
+                                      <p:to>
+                                        <p:strVal val="visible"/>
+                                      </p:to>
+                                    </p:set>
+                                    <p:animEffect transition="in" filter="fade">
+                                      <p:cBhvr>
+                                        <p:cTn id="10" dur="500"/>
+                                        <p:tgtEl>
+                                          <p:spTgt spid="4"/>
+                                        </p:tgtEl>
+                                      </p:cBhvr>
+                                    </p:animEffect>
+                                  </p:childTnLst>
+                                </p:cTn>
+                              </p:par>
+                            </p:childTnLst>
+                          </p:cTn>
+                        </p:par>
+                      </p:childTnLst>
+                    </p:cTn>
+                  </p:par>
+                </p:childTnLst>
+              </p:cTn>
+              <p:prevCondLst>
+                <p:cond evt="onPrev" delay="0">
+                  <p:tgtEl>
+                    <p:sldTgt/>
+                  </p:tgtEl>
+                </p:cond>
+              </p:prevCondLst>
+              <p:nextCondLst>
+                <p:cond evt="onNext" delay="0">
+                  <p:tgtEl>
+                    <p:sldTgt/>
+                  </p:tgtEl>
+                </p:cond>
+              </p:nextCondLst>
+            </p:seq>
+          </p:childTnLst>
+        </p:cTn>
       </p:par>
     </p:tnLst>
+    <p:bldLst>
+      <p:bldP spid="4" grpId="0"/>
+    </p:bldLst>
   </p:timing>
 </p:sld>
 </file>
 
-<file path=ppt/slides/slide8.xml><?xml version="1.0" encoding="utf-8"?>
+<file path=ppt/slides/slide9.xml><?xml version="1.0" encoding="utf-8"?>
 <p:sld xmlns:a="http://schemas.openxmlformats.org/drawingml/2006/main" xmlns:r="http://schemas.openxmlformats.org/officeDocument/2006/relationships" xmlns:p="http://schemas.openxmlformats.org/presentationml/2006/main">
   <p:cSld>
     <p:spTree>
@@ -7592,72 +8469,6 @@
           </a:extLst>
         </p:spPr>
       </p:pic>
-      <p:cxnSp>
-        <p:nvCxnSpPr>
-          <p:cNvPr id="5" name="Straight Arrow Connector 4"/>
-          <p:cNvCxnSpPr/>
-          <p:nvPr/>
-        </p:nvCxnSpPr>
-        <p:spPr>
-          <a:xfrm>
-            <a:off x="2843808" y="1268760"/>
-            <a:ext cx="1440160" cy="1080120"/>
-          </a:xfrm>
-          <a:prstGeom prst="straightConnector1">
-            <a:avLst/>
-          </a:prstGeom>
-          <a:ln w="38100">
-            <a:solidFill>
-              <a:schemeClr val="tx1"/>
-            </a:solidFill>
-            <a:tailEnd type="arrow"/>
-          </a:ln>
-        </p:spPr>
-        <p:style>
-          <a:lnRef idx="1">
-            <a:schemeClr val="accent1"/>
-          </a:lnRef>
-          <a:fillRef idx="0">
-            <a:schemeClr val="accent1"/>
-          </a:fillRef>
-          <a:effectRef idx="0">
-            <a:schemeClr val="accent1"/>
-          </a:effectRef>
-          <a:fontRef idx="minor">
-            <a:schemeClr val="tx1"/>
-          </a:fontRef>
-        </p:style>
-      </p:cxnSp>
-      <p:sp>
-        <p:nvSpPr>
-          <p:cNvPr id="6" name="TextBox 5"/>
-          <p:cNvSpPr txBox="1"/>
-          <p:nvPr/>
-        </p:nvSpPr>
-        <p:spPr>
-          <a:xfrm>
-            <a:off x="3851920" y="1412776"/>
-            <a:ext cx="2474524" cy="369332"/>
-          </a:xfrm>
-          <a:prstGeom prst="rect">
-            <a:avLst/>
-          </a:prstGeom>
-          <a:noFill/>
-        </p:spPr>
-        <p:txBody>
-          <a:bodyPr wrap="none" rtlCol="0">
-            <a:spAutoFit/>
-          </a:bodyPr>
-          <a:lstStyle/>
-          <a:p>
-            <a:r>
-              <a:rPr lang="en-NZ" dirty="0" smtClean="0"/>
-              <a:t>Wave number increasing</a:t>
-            </a:r>
-            <a:endParaRPr lang="en-NZ" dirty="0"/>
-          </a:p>
-        </p:txBody>
-      </p:sp>
       <p:sp>
         <p:nvSpPr>
           <p:cNvPr id="7" name="TextBox 6"/>
@@ -7701,1062 +8512,7 @@
   <p:timing>
     <p:tnLst>
       <p:par>
-        <p:cTn id="1" dur="indefinite" restart="never" nodeType="tmRoot">
-          <p:childTnLst>
-            <p:seq concurrent="1" nextAc="seek">
-              <p:cTn id="2" dur="indefinite" nodeType="mainSeq">
-                <p:childTnLst>
-                  <p:par>
-                    <p:cTn id="3" fill="hold">
-                      <p:stCondLst>
-                        <p:cond delay="indefinite"/>
-                      </p:stCondLst>
-                      <p:childTnLst>
-                        <p:par>
-                          <p:cTn id="4" fill="hold">
-                            <p:stCondLst>
-                              <p:cond delay="0"/>
-                            </p:stCondLst>
-                            <p:childTnLst>
-                              <p:par>
-                                <p:cTn id="5" presetID="10" presetClass="entr" presetSubtype="0" fill="hold" nodeType="clickEffect">
-                                  <p:stCondLst>
-                                    <p:cond delay="0"/>
-                                  </p:stCondLst>
-                                  <p:childTnLst>
-                                    <p:set>
-                                      <p:cBhvr>
-                                        <p:cTn id="6" dur="1" fill="hold">
-                                          <p:stCondLst>
-                                            <p:cond delay="0"/>
-                                          </p:stCondLst>
-                                        </p:cTn>
-                                        <p:tgtEl>
-                                          <p:spTgt spid="5"/>
-                                        </p:tgtEl>
-                                        <p:attrNameLst>
-                                          <p:attrName>style.visibility</p:attrName>
-                                        </p:attrNameLst>
-                                      </p:cBhvr>
-                                      <p:to>
-                                        <p:strVal val="visible"/>
-                                      </p:to>
-                                    </p:set>
-                                    <p:animEffect transition="in" filter="fade">
-                                      <p:cBhvr>
-                                        <p:cTn id="7" dur="500"/>
-                                        <p:tgtEl>
-                                          <p:spTgt spid="5"/>
-                                        </p:tgtEl>
-                                      </p:cBhvr>
-                                    </p:animEffect>
-                                  </p:childTnLst>
-                                </p:cTn>
-                              </p:par>
-                              <p:par>
-                                <p:cTn id="8" presetID="10" presetClass="entr" presetSubtype="0" fill="hold" grpId="0" nodeType="withEffect">
-                                  <p:stCondLst>
-                                    <p:cond delay="0"/>
-                                  </p:stCondLst>
-                                  <p:childTnLst>
-                                    <p:set>
-                                      <p:cBhvr>
-                                        <p:cTn id="9" dur="1" fill="hold">
-                                          <p:stCondLst>
-                                            <p:cond delay="0"/>
-                                          </p:stCondLst>
-                                        </p:cTn>
-                                        <p:tgtEl>
-                                          <p:spTgt spid="6"/>
-                                        </p:tgtEl>
-                                        <p:attrNameLst>
-                                          <p:attrName>style.visibility</p:attrName>
-                                        </p:attrNameLst>
-                                      </p:cBhvr>
-                                      <p:to>
-                                        <p:strVal val="visible"/>
-                                      </p:to>
-                                    </p:set>
-                                    <p:animEffect transition="in" filter="fade">
-                                      <p:cBhvr>
-                                        <p:cTn id="10" dur="500"/>
-                                        <p:tgtEl>
-                                          <p:spTgt spid="6"/>
-                                        </p:tgtEl>
-                                      </p:cBhvr>
-                                    </p:animEffect>
-                                  </p:childTnLst>
-                                </p:cTn>
-                              </p:par>
-                            </p:childTnLst>
-                          </p:cTn>
-                        </p:par>
-                      </p:childTnLst>
-                    </p:cTn>
-                  </p:par>
-                </p:childTnLst>
-              </p:cTn>
-              <p:prevCondLst>
-                <p:cond evt="onPrev" delay="0">
-                  <p:tgtEl>
-                    <p:sldTgt/>
-                  </p:tgtEl>
-                </p:cond>
-              </p:prevCondLst>
-              <p:nextCondLst>
-                <p:cond evt="onNext" delay="0">
-                  <p:tgtEl>
-                    <p:sldTgt/>
-                  </p:tgtEl>
-                </p:cond>
-              </p:nextCondLst>
-            </p:seq>
-          </p:childTnLst>
-        </p:cTn>
-      </p:par>
-    </p:tnLst>
-    <p:bldLst>
-      <p:bldP spid="6" grpId="0"/>
-    </p:bldLst>
-  </p:timing>
-</p:sld>
-</file>
-
-<file path=ppt/slides/slide9.xml><?xml version="1.0" encoding="utf-8"?>
-<p:sld xmlns:a="http://schemas.openxmlformats.org/drawingml/2006/main" xmlns:r="http://schemas.openxmlformats.org/officeDocument/2006/relationships" xmlns:p="http://schemas.openxmlformats.org/presentationml/2006/main">
-  <p:cSld>
-    <p:spTree>
-      <p:nvGrpSpPr>
-        <p:cNvPr id="1" name=""/>
-        <p:cNvGrpSpPr/>
-        <p:nvPr/>
-      </p:nvGrpSpPr>
-      <p:grpSpPr>
-        <a:xfrm>
-          <a:off x="0" y="0"/>
-          <a:ext cx="0" cy="0"/>
-          <a:chOff x="0" y="0"/>
-          <a:chExt cx="0" cy="0"/>
-        </a:xfrm>
-      </p:grpSpPr>
-      <p:sp>
-        <p:nvSpPr>
-          <p:cNvPr id="10" name="TextBox 9"/>
-          <p:cNvSpPr txBox="1"/>
-          <p:nvPr/>
-        </p:nvSpPr>
-        <p:spPr>
-          <a:xfrm>
-            <a:off x="1259632" y="332656"/>
-            <a:ext cx="6624736" cy="646331"/>
-          </a:xfrm>
-          <a:prstGeom prst="rect">
-            <a:avLst/>
-          </a:prstGeom>
-          <a:noFill/>
-        </p:spPr>
-        <p:txBody>
-          <a:bodyPr wrap="square" rtlCol="0">
-            <a:spAutoFit/>
-          </a:bodyPr>
-          <a:lstStyle/>
-          <a:p>
-            <a:r>
-              <a:rPr lang="en-NZ" dirty="0" smtClean="0"/>
-              <a:t>What is the relationship between beta, the single wave profile and </a:t>
-            </a:r>
-            <a:r>
-              <a:rPr lang="en-NZ" dirty="0" err="1" smtClean="0"/>
-              <a:t>t</a:t>
-            </a:r>
-            <a:r>
-              <a:rPr lang="en-NZ" baseline="-25000" dirty="0" err="1" smtClean="0"/>
-              <a:t>lag</a:t>
-            </a:r>
-            <a:r>
-              <a:rPr lang="en-NZ" baseline="-25000" dirty="0" smtClean="0"/>
-              <a:t> </a:t>
-            </a:r>
-            <a:r>
-              <a:rPr lang="en-NZ" dirty="0" smtClean="0"/>
-              <a:t>for zero diffusion?</a:t>
-            </a:r>
-            <a:endParaRPr lang="en-NZ" dirty="0"/>
-          </a:p>
-        </p:txBody>
-      </p:sp>
-      <p:sp>
-        <p:nvSpPr>
-          <p:cNvPr id="12" name="Title 1"/>
-          <p:cNvSpPr>
-            <a:spLocks noGrp="1"/>
-          </p:cNvSpPr>
-          <p:nvPr>
-            <p:ph type="title"/>
-          </p:nvPr>
-        </p:nvSpPr>
-        <p:spPr>
-          <a:xfrm>
-            <a:off x="467544" y="764704"/>
-            <a:ext cx="8424936" cy="864096"/>
-          </a:xfrm>
-        </p:spPr>
-        <p:txBody>
-          <a:bodyPr>
-            <a:noAutofit/>
-          </a:bodyPr>
-          <a:lstStyle/>
-          <a:p>
-            <a:pPr algn="ctr"/>
-            <a:r>
-              <a:rPr lang="en-NZ" sz="4400" dirty="0" smtClean="0">
-                <a:solidFill>
-                  <a:schemeClr val="tx1"/>
-                </a:solidFill>
-              </a:rPr>
-              <a:t>Beta vs Single Wave Profile</a:t>
-            </a:r>
-            <a:endParaRPr lang="en-NZ" dirty="0">
-              <a:solidFill>
-                <a:schemeClr val="tx1"/>
-              </a:solidFill>
-            </a:endParaRPr>
-          </a:p>
-        </p:txBody>
-      </p:sp>
-      <p:pic>
-        <p:nvPicPr>
-          <p:cNvPr id="7" name="Picture 4"/>
-          <p:cNvPicPr>
-            <a:picLocks noChangeAspect="1" noChangeArrowheads="1"/>
-          </p:cNvPicPr>
-          <p:nvPr/>
-        </p:nvPicPr>
-        <p:blipFill rotWithShape="1">
-          <a:blip r:embed="rId2">
-            <a:clrChange>
-              <a:clrFrom>
-                <a:srgbClr val="FFFFFF"/>
-              </a:clrFrom>
-              <a:clrTo>
-                <a:srgbClr val="FFFFFF">
-                  <a:alpha val="0"/>
-                </a:srgbClr>
-              </a:clrTo>
-            </a:clrChange>
-            <a:extLst>
-              <a:ext uri="{28A0092B-C50C-407E-A947-70E740481C1C}">
-                <a14:useLocalDpi xmlns:a14="http://schemas.microsoft.com/office/drawing/2010/main" val="0"/>
-              </a:ext>
-            </a:extLst>
-          </a:blip>
-          <a:srcRect l="13952" t="10387" r="11068" b="11855"/>
-          <a:stretch/>
-        </p:blipFill>
-        <p:spPr bwMode="auto">
-          <a:xfrm>
-            <a:off x="1763688" y="1556792"/>
-            <a:ext cx="5096593" cy="3964016"/>
-          </a:xfrm>
-          <a:prstGeom prst="rect">
-            <a:avLst/>
-          </a:prstGeom>
-          <a:noFill/>
-          <a:ln>
-            <a:noFill/>
-          </a:ln>
-          <a:effectLst/>
-          <a:extLst>
-            <a:ext uri="{909E8E84-426E-40DD-AFC4-6F175D3DCCD1}">
-              <a14:hiddenFill xmlns:a14="http://schemas.microsoft.com/office/drawing/2010/main">
-                <a:solidFill>
-                  <a:schemeClr val="accent1"/>
-                </a:solidFill>
-              </a14:hiddenFill>
-            </a:ext>
-            <a:ext uri="{91240B29-F687-4F45-9708-019B960494DF}">
-              <a14:hiddenLine xmlns:a14="http://schemas.microsoft.com/office/drawing/2010/main" w="9525">
-                <a:solidFill>
-                  <a:schemeClr val="tx1"/>
-                </a:solidFill>
-                <a:miter lim="800000"/>
-                <a:headEnd/>
-                <a:tailEnd/>
-              </a14:hiddenLine>
-            </a:ext>
-            <a:ext uri="{AF507438-7753-43E0-B8FC-AC1667EBCBE1}">
-              <a14:hiddenEffects xmlns:a14="http://schemas.microsoft.com/office/drawing/2010/main">
-                <a:effectLst>
-                  <a:outerShdw dist="35921" dir="2700000" algn="ctr" rotWithShape="0">
-                    <a:schemeClr val="bg2"/>
-                  </a:outerShdw>
-                </a:effectLst>
-              </a14:hiddenEffects>
-            </a:ext>
-          </a:extLst>
-        </p:spPr>
-      </p:pic>
-      <p:grpSp>
-        <p:nvGrpSpPr>
-          <p:cNvPr id="18" name="Group 17"/>
-          <p:cNvGrpSpPr/>
-          <p:nvPr/>
-        </p:nvGrpSpPr>
-        <p:grpSpPr>
-          <a:xfrm>
-            <a:off x="971600" y="4643844"/>
-            <a:ext cx="3600400" cy="801380"/>
-            <a:chOff x="971600" y="4643844"/>
-            <a:chExt cx="3600400" cy="801380"/>
-          </a:xfrm>
-        </p:grpSpPr>
-        <p:cxnSp>
-          <p:nvCxnSpPr>
-            <p:cNvPr id="4" name="Straight Connector 3"/>
-            <p:cNvCxnSpPr/>
-            <p:nvPr/>
-          </p:nvCxnSpPr>
-          <p:spPr>
-            <a:xfrm flipV="1">
-              <a:off x="971600" y="5085184"/>
-              <a:ext cx="3600400" cy="360040"/>
-            </a:xfrm>
-            <a:prstGeom prst="line">
-              <a:avLst/>
-            </a:prstGeom>
-            <a:ln w="38100">
-              <a:solidFill>
-                <a:srgbClr val="7030A0"/>
-              </a:solidFill>
-              <a:prstDash val="sysDash"/>
-            </a:ln>
-          </p:spPr>
-          <p:style>
-            <a:lnRef idx="1">
-              <a:schemeClr val="accent1"/>
-            </a:lnRef>
-            <a:fillRef idx="0">
-              <a:schemeClr val="accent1"/>
-            </a:fillRef>
-            <a:effectRef idx="0">
-              <a:schemeClr val="accent1"/>
-            </a:effectRef>
-            <a:fontRef idx="minor">
-              <a:schemeClr val="tx1"/>
-            </a:fontRef>
-          </p:style>
-        </p:cxnSp>
-        <p:sp>
-          <p:nvSpPr>
-            <p:cNvPr id="6" name="TextBox 5"/>
-            <p:cNvSpPr txBox="1"/>
-            <p:nvPr/>
-          </p:nvSpPr>
-          <p:spPr>
-            <a:xfrm>
-              <a:off x="1043608" y="4643844"/>
-              <a:ext cx="3040128" cy="369332"/>
-            </a:xfrm>
-            <a:prstGeom prst="rect">
-              <a:avLst/>
-            </a:prstGeom>
-            <a:noFill/>
-          </p:spPr>
-          <p:txBody>
-            <a:bodyPr wrap="none" rtlCol="0">
-              <a:spAutoFit/>
-            </a:bodyPr>
-            <a:lstStyle/>
-            <a:p>
-              <a:r>
-                <a:rPr lang="en-NZ" dirty="0" smtClean="0">
-                  <a:solidFill>
-                    <a:srgbClr val="7030A0"/>
-                  </a:solidFill>
-                </a:rPr>
-                <a:t>Average Rate of Slow Increase</a:t>
-              </a:r>
-              <a:endParaRPr lang="en-NZ" dirty="0">
-                <a:solidFill>
-                  <a:srgbClr val="7030A0"/>
-                </a:solidFill>
-              </a:endParaRPr>
-            </a:p>
-          </p:txBody>
-        </p:sp>
-      </p:grpSp>
-      <p:grpSp>
-        <p:nvGrpSpPr>
-          <p:cNvPr id="32" name="Group 31"/>
-          <p:cNvGrpSpPr/>
-          <p:nvPr/>
-        </p:nvGrpSpPr>
-        <p:grpSpPr>
-          <a:xfrm>
-            <a:off x="2660519" y="1916832"/>
-            <a:ext cx="2343529" cy="3803199"/>
-            <a:chOff x="2660519" y="1916832"/>
-            <a:chExt cx="2343529" cy="3803199"/>
-          </a:xfrm>
-        </p:grpSpPr>
-        <p:grpSp>
-          <p:nvGrpSpPr>
-            <p:cNvPr id="17" name="Group 16"/>
-            <p:cNvGrpSpPr/>
-            <p:nvPr/>
-          </p:nvGrpSpPr>
-          <p:grpSpPr>
-            <a:xfrm>
-              <a:off x="2660519" y="1916832"/>
-              <a:ext cx="2343529" cy="3312368"/>
-              <a:chOff x="2660519" y="1916832"/>
-              <a:chExt cx="2343529" cy="3312368"/>
-            </a:xfrm>
-          </p:grpSpPr>
-          <p:cxnSp>
-            <p:nvCxnSpPr>
-              <p:cNvPr id="13" name="Straight Connector 12"/>
-              <p:cNvCxnSpPr/>
-              <p:nvPr/>
-            </p:nvCxnSpPr>
-            <p:spPr>
-              <a:xfrm flipV="1">
-                <a:off x="4788024" y="1916832"/>
-                <a:ext cx="216024" cy="3312368"/>
-              </a:xfrm>
-              <a:prstGeom prst="line">
-                <a:avLst/>
-              </a:prstGeom>
-              <a:ln w="38100">
-                <a:solidFill>
-                  <a:srgbClr val="00B050"/>
-                </a:solidFill>
-                <a:prstDash val="sysDash"/>
-              </a:ln>
-            </p:spPr>
-            <p:style>
-              <a:lnRef idx="1">
-                <a:schemeClr val="accent1"/>
-              </a:lnRef>
-              <a:fillRef idx="0">
-                <a:schemeClr val="accent1"/>
-              </a:fillRef>
-              <a:effectRef idx="0">
-                <a:schemeClr val="accent1"/>
-              </a:effectRef>
-              <a:fontRef idx="minor">
-                <a:schemeClr val="tx1"/>
-              </a:fontRef>
-            </p:style>
-          </p:cxnSp>
-          <p:sp>
-            <p:nvSpPr>
-              <p:cNvPr id="14" name="TextBox 13"/>
-              <p:cNvSpPr txBox="1"/>
-              <p:nvPr/>
-            </p:nvSpPr>
-            <p:spPr>
-              <a:xfrm>
-                <a:off x="2660519" y="2924944"/>
-                <a:ext cx="2127505" cy="369332"/>
-              </a:xfrm>
-              <a:prstGeom prst="rect">
-                <a:avLst/>
-              </a:prstGeom>
-              <a:noFill/>
-            </p:spPr>
-            <p:txBody>
-              <a:bodyPr wrap="none" rtlCol="0">
-                <a:spAutoFit/>
-              </a:bodyPr>
-              <a:lstStyle/>
-              <a:p>
-                <a:r>
-                  <a:rPr lang="en-NZ" dirty="0" smtClean="0">
-                    <a:solidFill>
-                      <a:srgbClr val="00B050"/>
-                    </a:solidFill>
-                  </a:rPr>
-                  <a:t>Rate of Fast Increase</a:t>
-                </a:r>
-                <a:endParaRPr lang="en-NZ" dirty="0">
-                  <a:solidFill>
-                    <a:srgbClr val="00B050"/>
-                  </a:solidFill>
-                </a:endParaRPr>
-              </a:p>
-            </p:txBody>
-          </p:sp>
-        </p:grpSp>
-        <p:sp>
-          <p:nvSpPr>
-            <p:cNvPr id="28" name="TextBox 27"/>
-            <p:cNvSpPr txBox="1"/>
-            <p:nvPr/>
-          </p:nvSpPr>
-          <p:spPr>
-            <a:xfrm>
-              <a:off x="3640564" y="5350699"/>
-              <a:ext cx="1255472" cy="369332"/>
-            </a:xfrm>
-            <a:prstGeom prst="rect">
-              <a:avLst/>
-            </a:prstGeom>
-            <a:noFill/>
-          </p:spPr>
-          <p:txBody>
-            <a:bodyPr wrap="none" rtlCol="0">
-              <a:spAutoFit/>
-            </a:bodyPr>
-            <a:lstStyle/>
-            <a:p>
-              <a:r>
-                <a:rPr lang="en-NZ" dirty="0" smtClean="0">
-                  <a:solidFill>
-                    <a:srgbClr val="00B050"/>
-                  </a:solidFill>
-                </a:rPr>
-                <a:t>% Location</a:t>
-              </a:r>
-              <a:endParaRPr lang="en-NZ" dirty="0">
-                <a:solidFill>
-                  <a:srgbClr val="00B050"/>
-                </a:solidFill>
-              </a:endParaRPr>
-            </a:p>
-          </p:txBody>
-        </p:sp>
-      </p:grpSp>
-      <p:grpSp>
-        <p:nvGrpSpPr>
-          <p:cNvPr id="33" name="Group 32"/>
-          <p:cNvGrpSpPr/>
-          <p:nvPr/>
-        </p:nvGrpSpPr>
-        <p:grpSpPr>
-          <a:xfrm>
-            <a:off x="4420700" y="1700808"/>
-            <a:ext cx="2215080" cy="4473788"/>
-            <a:chOff x="4420700" y="1700808"/>
-            <a:chExt cx="2215080" cy="4473788"/>
-          </a:xfrm>
-        </p:grpSpPr>
-        <p:sp>
-          <p:nvSpPr>
-            <p:cNvPr id="24" name="Multiply 23"/>
-            <p:cNvSpPr/>
-            <p:nvPr/>
-          </p:nvSpPr>
-          <p:spPr>
-            <a:xfrm>
-              <a:off x="4932040" y="1700808"/>
-              <a:ext cx="324036" cy="360040"/>
-            </a:xfrm>
-            <a:prstGeom prst="mathMultiply">
-              <a:avLst/>
-            </a:prstGeom>
-          </p:spPr>
-          <p:style>
-            <a:lnRef idx="2">
-              <a:schemeClr val="accent1">
-                <a:shade val="50000"/>
-              </a:schemeClr>
-            </a:lnRef>
-            <a:fillRef idx="1">
-              <a:schemeClr val="accent1"/>
-            </a:fillRef>
-            <a:effectRef idx="0">
-              <a:schemeClr val="accent1"/>
-            </a:effectRef>
-            <a:fontRef idx="minor">
-              <a:schemeClr val="lt1"/>
-            </a:fontRef>
-          </p:style>
-          <p:txBody>
-            <a:bodyPr rtlCol="0" anchor="ctr"/>
-            <a:lstStyle/>
-            <a:p>
-              <a:pPr algn="ctr"/>
-              <a:endParaRPr lang="en-NZ"/>
-            </a:p>
-          </p:txBody>
-        </p:sp>
-        <p:sp>
-          <p:nvSpPr>
-            <p:cNvPr id="25" name="TextBox 24"/>
-            <p:cNvSpPr txBox="1"/>
-            <p:nvPr/>
-          </p:nvSpPr>
-          <p:spPr>
-            <a:xfrm>
-              <a:off x="5489312" y="1743286"/>
-              <a:ext cx="1146468" cy="369332"/>
-            </a:xfrm>
-            <a:prstGeom prst="rect">
-              <a:avLst/>
-            </a:prstGeom>
-            <a:noFill/>
-          </p:spPr>
-          <p:txBody>
-            <a:bodyPr wrap="none" rtlCol="0">
-              <a:spAutoFit/>
-            </a:bodyPr>
-            <a:lstStyle/>
-            <a:p>
-              <a:r>
-                <a:rPr lang="en-NZ" dirty="0" smtClean="0">
-                  <a:solidFill>
-                    <a:srgbClr val="FF0000"/>
-                  </a:solidFill>
-                </a:rPr>
-                <a:t>Maximum</a:t>
-              </a:r>
-              <a:endParaRPr lang="en-NZ" dirty="0">
-                <a:solidFill>
-                  <a:srgbClr val="FF0000"/>
-                </a:solidFill>
-              </a:endParaRPr>
-            </a:p>
-          </p:txBody>
-        </p:sp>
-        <p:sp>
-          <p:nvSpPr>
-            <p:cNvPr id="29" name="TextBox 28"/>
-            <p:cNvSpPr txBox="1"/>
-            <p:nvPr/>
-          </p:nvSpPr>
-          <p:spPr>
-            <a:xfrm>
-              <a:off x="4420700" y="5805264"/>
-              <a:ext cx="1255472" cy="369332"/>
-            </a:xfrm>
-            <a:prstGeom prst="rect">
-              <a:avLst/>
-            </a:prstGeom>
-            <a:noFill/>
-          </p:spPr>
-          <p:txBody>
-            <a:bodyPr wrap="none" rtlCol="0">
-              <a:spAutoFit/>
-            </a:bodyPr>
-            <a:lstStyle/>
-            <a:p>
-              <a:r>
-                <a:rPr lang="en-NZ" dirty="0" smtClean="0">
-                  <a:solidFill>
-                    <a:srgbClr val="FF0000"/>
-                  </a:solidFill>
-                </a:rPr>
-                <a:t>% Location</a:t>
-              </a:r>
-              <a:endParaRPr lang="en-NZ" dirty="0">
-                <a:solidFill>
-                  <a:srgbClr val="FF0000"/>
-                </a:solidFill>
-              </a:endParaRPr>
-            </a:p>
-          </p:txBody>
-        </p:sp>
-      </p:grpSp>
-      <p:grpSp>
-        <p:nvGrpSpPr>
-          <p:cNvPr id="31" name="Group 30"/>
-          <p:cNvGrpSpPr/>
-          <p:nvPr/>
-        </p:nvGrpSpPr>
-        <p:grpSpPr>
-          <a:xfrm>
-            <a:off x="5148064" y="2060848"/>
-            <a:ext cx="2554109" cy="3672408"/>
-            <a:chOff x="5148064" y="2060848"/>
-            <a:chExt cx="2554109" cy="3672408"/>
-          </a:xfrm>
-        </p:grpSpPr>
-        <p:grpSp>
-          <p:nvGrpSpPr>
-            <p:cNvPr id="19" name="Group 18"/>
-            <p:cNvGrpSpPr/>
-            <p:nvPr/>
-          </p:nvGrpSpPr>
-          <p:grpSpPr>
-            <a:xfrm>
-              <a:off x="5148064" y="2060848"/>
-              <a:ext cx="2554109" cy="3312368"/>
-              <a:chOff x="539552" y="3763337"/>
-              <a:chExt cx="2554109" cy="3312368"/>
-            </a:xfrm>
-          </p:grpSpPr>
-          <p:cxnSp>
-            <p:nvCxnSpPr>
-              <p:cNvPr id="20" name="Straight Connector 19"/>
-              <p:cNvCxnSpPr/>
-              <p:nvPr/>
-            </p:nvCxnSpPr>
-            <p:spPr>
-              <a:xfrm>
-                <a:off x="539552" y="3763337"/>
-                <a:ext cx="1080120" cy="3312368"/>
-              </a:xfrm>
-              <a:prstGeom prst="line">
-                <a:avLst/>
-              </a:prstGeom>
-              <a:ln w="38100">
-                <a:solidFill>
-                  <a:srgbClr val="FB05DE"/>
-                </a:solidFill>
-                <a:prstDash val="sysDash"/>
-              </a:ln>
-            </p:spPr>
-            <p:style>
-              <a:lnRef idx="1">
-                <a:schemeClr val="accent1"/>
-              </a:lnRef>
-              <a:fillRef idx="0">
-                <a:schemeClr val="accent1"/>
-              </a:fillRef>
-              <a:effectRef idx="0">
-                <a:schemeClr val="accent1"/>
-              </a:effectRef>
-              <a:fontRef idx="minor">
-                <a:schemeClr val="tx1"/>
-              </a:fontRef>
-            </p:style>
-          </p:cxnSp>
-          <p:sp>
-            <p:nvSpPr>
-              <p:cNvPr id="21" name="TextBox 20"/>
-              <p:cNvSpPr txBox="1"/>
-              <p:nvPr/>
-            </p:nvSpPr>
-            <p:spPr>
-              <a:xfrm>
-                <a:off x="1331640" y="4643844"/>
-                <a:ext cx="1762021" cy="369332"/>
-              </a:xfrm>
-              <a:prstGeom prst="rect">
-                <a:avLst/>
-              </a:prstGeom>
-              <a:noFill/>
-            </p:spPr>
-            <p:txBody>
-              <a:bodyPr wrap="none" rtlCol="0">
-                <a:spAutoFit/>
-              </a:bodyPr>
-              <a:lstStyle/>
-              <a:p>
-                <a:r>
-                  <a:rPr lang="en-NZ" dirty="0" smtClean="0">
-                    <a:solidFill>
-                      <a:srgbClr val="FB05DE"/>
-                    </a:solidFill>
-                  </a:rPr>
-                  <a:t>Rate of Decrease</a:t>
-                </a:r>
-                <a:endParaRPr lang="en-NZ" dirty="0">
-                  <a:solidFill>
-                    <a:srgbClr val="FB05DE"/>
-                  </a:solidFill>
-                </a:endParaRPr>
-              </a:p>
-            </p:txBody>
-          </p:sp>
-        </p:grpSp>
-        <p:sp>
-          <p:nvSpPr>
-            <p:cNvPr id="30" name="TextBox 29"/>
-            <p:cNvSpPr txBox="1"/>
-            <p:nvPr/>
-          </p:nvSpPr>
-          <p:spPr>
-            <a:xfrm>
-              <a:off x="5188736" y="5363924"/>
-              <a:ext cx="1255472" cy="369332"/>
-            </a:xfrm>
-            <a:prstGeom prst="rect">
-              <a:avLst/>
-            </a:prstGeom>
-            <a:noFill/>
-          </p:spPr>
-          <p:txBody>
-            <a:bodyPr wrap="none" rtlCol="0">
-              <a:spAutoFit/>
-            </a:bodyPr>
-            <a:lstStyle/>
-            <a:p>
-              <a:r>
-                <a:rPr lang="en-NZ" dirty="0" smtClean="0">
-                  <a:solidFill>
-                    <a:srgbClr val="FB05DE"/>
-                  </a:solidFill>
-                </a:rPr>
-                <a:t>% Location</a:t>
-              </a:r>
-              <a:endParaRPr lang="en-NZ" dirty="0">
-                <a:solidFill>
-                  <a:srgbClr val="FB05DE"/>
-                </a:solidFill>
-              </a:endParaRPr>
-            </a:p>
-          </p:txBody>
-        </p:sp>
-      </p:grpSp>
-    </p:spTree>
-    <p:extLst>
-      <p:ext uri="{BB962C8B-B14F-4D97-AF65-F5344CB8AC3E}">
-        <p14:creationId xmlns:p14="http://schemas.microsoft.com/office/powerpoint/2010/main" val="2806993774"/>
-      </p:ext>
-    </p:extLst>
-  </p:cSld>
-  <p:clrMapOvr>
-    <a:masterClrMapping/>
-  </p:clrMapOvr>
-  <mc:AlternateContent xmlns:mc="http://schemas.openxmlformats.org/markup-compatibility/2006">
-    <mc:Choice xmlns:p14="http://schemas.microsoft.com/office/powerpoint/2010/main" Requires="p14">
-      <p:transition p14:dur="0"/>
-    </mc:Choice>
-    <mc:Fallback>
-      <p:transition/>
-    </mc:Fallback>
-  </mc:AlternateContent>
-  <p:timing>
-    <p:tnLst>
-      <p:par>
-        <p:cTn id="1" dur="indefinite" restart="never" nodeType="tmRoot">
-          <p:childTnLst>
-            <p:seq concurrent="1" nextAc="seek">
-              <p:cTn id="2" dur="indefinite" nodeType="mainSeq">
-                <p:childTnLst>
-                  <p:par>
-                    <p:cTn id="3" fill="hold">
-                      <p:stCondLst>
-                        <p:cond delay="indefinite"/>
-                      </p:stCondLst>
-                      <p:childTnLst>
-                        <p:par>
-                          <p:cTn id="4" fill="hold">
-                            <p:stCondLst>
-                              <p:cond delay="0"/>
-                            </p:stCondLst>
-                            <p:childTnLst>
-                              <p:par>
-                                <p:cTn id="5" presetID="10" presetClass="entr" presetSubtype="0" fill="hold" nodeType="clickEffect">
-                                  <p:stCondLst>
-                                    <p:cond delay="0"/>
-                                  </p:stCondLst>
-                                  <p:childTnLst>
-                                    <p:set>
-                                      <p:cBhvr>
-                                        <p:cTn id="6" dur="1" fill="hold">
-                                          <p:stCondLst>
-                                            <p:cond delay="0"/>
-                                          </p:stCondLst>
-                                        </p:cTn>
-                                        <p:tgtEl>
-                                          <p:spTgt spid="18"/>
-                                        </p:tgtEl>
-                                        <p:attrNameLst>
-                                          <p:attrName>style.visibility</p:attrName>
-                                        </p:attrNameLst>
-                                      </p:cBhvr>
-                                      <p:to>
-                                        <p:strVal val="visible"/>
-                                      </p:to>
-                                    </p:set>
-                                    <p:animEffect transition="in" filter="fade">
-                                      <p:cBhvr>
-                                        <p:cTn id="7" dur="500"/>
-                                        <p:tgtEl>
-                                          <p:spTgt spid="18"/>
-                                        </p:tgtEl>
-                                      </p:cBhvr>
-                                    </p:animEffect>
-                                  </p:childTnLst>
-                                </p:cTn>
-                              </p:par>
-                            </p:childTnLst>
-                          </p:cTn>
-                        </p:par>
-                      </p:childTnLst>
-                    </p:cTn>
-                  </p:par>
-                  <p:par>
-                    <p:cTn id="8" fill="hold">
-                      <p:stCondLst>
-                        <p:cond delay="indefinite"/>
-                      </p:stCondLst>
-                      <p:childTnLst>
-                        <p:par>
-                          <p:cTn id="9" fill="hold">
-                            <p:stCondLst>
-                              <p:cond delay="0"/>
-                            </p:stCondLst>
-                            <p:childTnLst>
-                              <p:par>
-                                <p:cTn id="10" presetID="10" presetClass="entr" presetSubtype="0" fill="hold" nodeType="clickEffect">
-                                  <p:stCondLst>
-                                    <p:cond delay="0"/>
-                                  </p:stCondLst>
-                                  <p:childTnLst>
-                                    <p:set>
-                                      <p:cBhvr>
-                                        <p:cTn id="11" dur="1" fill="hold">
-                                          <p:stCondLst>
-                                            <p:cond delay="0"/>
-                                          </p:stCondLst>
-                                        </p:cTn>
-                                        <p:tgtEl>
-                                          <p:spTgt spid="32"/>
-                                        </p:tgtEl>
-                                        <p:attrNameLst>
-                                          <p:attrName>style.visibility</p:attrName>
-                                        </p:attrNameLst>
-                                      </p:cBhvr>
-                                      <p:to>
-                                        <p:strVal val="visible"/>
-                                      </p:to>
-                                    </p:set>
-                                    <p:animEffect transition="in" filter="fade">
-                                      <p:cBhvr>
-                                        <p:cTn id="12" dur="500"/>
-                                        <p:tgtEl>
-                                          <p:spTgt spid="32"/>
-                                        </p:tgtEl>
-                                      </p:cBhvr>
-                                    </p:animEffect>
-                                  </p:childTnLst>
-                                </p:cTn>
-                              </p:par>
-                            </p:childTnLst>
-                          </p:cTn>
-                        </p:par>
-                      </p:childTnLst>
-                    </p:cTn>
-                  </p:par>
-                  <p:par>
-                    <p:cTn id="13" fill="hold">
-                      <p:stCondLst>
-                        <p:cond delay="indefinite"/>
-                      </p:stCondLst>
-                      <p:childTnLst>
-                        <p:par>
-                          <p:cTn id="14" fill="hold">
-                            <p:stCondLst>
-                              <p:cond delay="0"/>
-                            </p:stCondLst>
-                            <p:childTnLst>
-                              <p:par>
-                                <p:cTn id="15" presetID="10" presetClass="entr" presetSubtype="0" fill="hold" nodeType="clickEffect">
-                                  <p:stCondLst>
-                                    <p:cond delay="0"/>
-                                  </p:stCondLst>
-                                  <p:childTnLst>
-                                    <p:set>
-                                      <p:cBhvr>
-                                        <p:cTn id="16" dur="1" fill="hold">
-                                          <p:stCondLst>
-                                            <p:cond delay="0"/>
-                                          </p:stCondLst>
-                                        </p:cTn>
-                                        <p:tgtEl>
-                                          <p:spTgt spid="33"/>
-                                        </p:tgtEl>
-                                        <p:attrNameLst>
-                                          <p:attrName>style.visibility</p:attrName>
-                                        </p:attrNameLst>
-                                      </p:cBhvr>
-                                      <p:to>
-                                        <p:strVal val="visible"/>
-                                      </p:to>
-                                    </p:set>
-                                    <p:animEffect transition="in" filter="fade">
-                                      <p:cBhvr>
-                                        <p:cTn id="17" dur="500"/>
-                                        <p:tgtEl>
-                                          <p:spTgt spid="33"/>
-                                        </p:tgtEl>
-                                      </p:cBhvr>
-                                    </p:animEffect>
-                                  </p:childTnLst>
-                                </p:cTn>
-                              </p:par>
-                            </p:childTnLst>
-                          </p:cTn>
-                        </p:par>
-                      </p:childTnLst>
-                    </p:cTn>
-                  </p:par>
-                  <p:par>
-                    <p:cTn id="18" fill="hold">
-                      <p:stCondLst>
-                        <p:cond delay="indefinite"/>
-                      </p:stCondLst>
-                      <p:childTnLst>
-                        <p:par>
-                          <p:cTn id="19" fill="hold">
-                            <p:stCondLst>
-                              <p:cond delay="0"/>
-                            </p:stCondLst>
-                            <p:childTnLst>
-                              <p:par>
-                                <p:cTn id="20" presetID="10" presetClass="entr" presetSubtype="0" fill="hold" nodeType="clickEffect">
-                                  <p:stCondLst>
-                                    <p:cond delay="0"/>
-                                  </p:stCondLst>
-                                  <p:childTnLst>
-                                    <p:set>
-                                      <p:cBhvr>
-                                        <p:cTn id="21" dur="1" fill="hold">
-                                          <p:stCondLst>
-                                            <p:cond delay="0"/>
-                                          </p:stCondLst>
-                                        </p:cTn>
-                                        <p:tgtEl>
-                                          <p:spTgt spid="31"/>
-                                        </p:tgtEl>
-                                        <p:attrNameLst>
-                                          <p:attrName>style.visibility</p:attrName>
-                                        </p:attrNameLst>
-                                      </p:cBhvr>
-                                      <p:to>
-                                        <p:strVal val="visible"/>
-                                      </p:to>
-                                    </p:set>
-                                    <p:animEffect transition="in" filter="fade">
-                                      <p:cBhvr>
-                                        <p:cTn id="22" dur="500"/>
-                                        <p:tgtEl>
-                                          <p:spTgt spid="31"/>
-                                        </p:tgtEl>
-                                      </p:cBhvr>
-                                    </p:animEffect>
-                                  </p:childTnLst>
-                                </p:cTn>
-                              </p:par>
-                            </p:childTnLst>
-                          </p:cTn>
-                        </p:par>
-                      </p:childTnLst>
-                    </p:cTn>
-                  </p:par>
-                </p:childTnLst>
-              </p:cTn>
-              <p:prevCondLst>
-                <p:cond evt="onPrev" delay="0">
-                  <p:tgtEl>
-                    <p:sldTgt/>
-                  </p:tgtEl>
-                </p:cond>
-              </p:prevCondLst>
-              <p:nextCondLst>
-                <p:cond evt="onNext" delay="0">
-                  <p:tgtEl>
-                    <p:sldTgt/>
-                  </p:tgtEl>
-                </p:cond>
-              </p:nextCondLst>
-            </p:seq>
-          </p:childTnLst>
-        </p:cTn>
+        <p:cTn id="1" dur="indefinite" restart="never" nodeType="tmRoot"/>
       </p:par>
     </p:tnLst>
   </p:timing>

</xml_diff>